<commit_message>
-created section Concept Model and Database
</commit_message>
<xml_diff>
--- a/slides.pptx
+++ b/slides.pptx
@@ -8,8 +8,14 @@
     <p:sldId id="256" r:id="rId2"/>
     <p:sldId id="257" r:id="rId3"/>
     <p:sldId id="258" r:id="rId4"/>
-    <p:sldId id="259" r:id="rId5"/>
-    <p:sldId id="260" r:id="rId6"/>
+    <p:sldId id="261" r:id="rId5"/>
+    <p:sldId id="262" r:id="rId6"/>
+    <p:sldId id="263" r:id="rId7"/>
+    <p:sldId id="264" r:id="rId8"/>
+    <p:sldId id="266" r:id="rId9"/>
+    <p:sldId id="259" r:id="rId10"/>
+    <p:sldId id="265" r:id="rId11"/>
+    <p:sldId id="260" r:id="rId12"/>
   </p:sldIdLst>
   <p:sldSz cx="12192000" cy="6858000"/>
   <p:notesSz cx="6858000" cy="9144000"/>
@@ -121,14 +127,20 @@
             <p14:sldId id="257"/>
           </p14:sldIdLst>
         </p14:section>
-        <p14:section name="Modeling" id="{3777355D-2D23-4C83-B764-A5EE608C6C9A}">
+        <p14:section name="Concept Model" id="{3777355D-2D23-4C83-B764-A5EE608C6C9A}">
           <p14:sldIdLst>
             <p14:sldId id="258"/>
+            <p14:sldId id="261"/>
+            <p14:sldId id="262"/>
           </p14:sldIdLst>
         </p14:section>
-        <p14:section name="Performance" id="{D2EB47A8-6615-4D9A-B175-425759F1061E}">
+        <p14:section name="Database" id="{D2EB47A8-6615-4D9A-B175-425759F1061E}">
           <p14:sldIdLst>
+            <p14:sldId id="263"/>
+            <p14:sldId id="264"/>
+            <p14:sldId id="266"/>
             <p14:sldId id="259"/>
+            <p14:sldId id="265"/>
           </p14:sldIdLst>
         </p14:section>
         <p14:section name="Frontend" id="{AE0EC636-3150-40C4-BFAE-C6DB3C967D11}">
@@ -273,7 +285,7 @@
           <a:p>
             <a:fld id="{2D4AA6EA-0D90-46F4-B247-6A5A21F7EDC4}" type="datetimeFigureOut">
               <a:rPr lang="de-DE" smtClean="0"/>
-              <a:t>20.01.2016</a:t>
+              <a:t>23.01.2016</a:t>
             </a:fld>
             <a:endParaRPr lang="de-DE"/>
           </a:p>
@@ -443,7 +455,7 @@
           <a:p>
             <a:fld id="{2D4AA6EA-0D90-46F4-B247-6A5A21F7EDC4}" type="datetimeFigureOut">
               <a:rPr lang="de-DE" smtClean="0"/>
-              <a:t>20.01.2016</a:t>
+              <a:t>23.01.2016</a:t>
             </a:fld>
             <a:endParaRPr lang="de-DE"/>
           </a:p>
@@ -623,7 +635,7 @@
           <a:p>
             <a:fld id="{2D4AA6EA-0D90-46F4-B247-6A5A21F7EDC4}" type="datetimeFigureOut">
               <a:rPr lang="de-DE" smtClean="0"/>
-              <a:t>20.01.2016</a:t>
+              <a:t>23.01.2016</a:t>
             </a:fld>
             <a:endParaRPr lang="de-DE"/>
           </a:p>
@@ -793,7 +805,7 @@
           <a:p>
             <a:fld id="{2D4AA6EA-0D90-46F4-B247-6A5A21F7EDC4}" type="datetimeFigureOut">
               <a:rPr lang="de-DE" smtClean="0"/>
-              <a:t>20.01.2016</a:t>
+              <a:t>23.01.2016</a:t>
             </a:fld>
             <a:endParaRPr lang="de-DE"/>
           </a:p>
@@ -1039,7 +1051,7 @@
           <a:p>
             <a:fld id="{2D4AA6EA-0D90-46F4-B247-6A5A21F7EDC4}" type="datetimeFigureOut">
               <a:rPr lang="de-DE" smtClean="0"/>
-              <a:t>20.01.2016</a:t>
+              <a:t>23.01.2016</a:t>
             </a:fld>
             <a:endParaRPr lang="de-DE"/>
           </a:p>
@@ -1271,7 +1283,7 @@
           <a:p>
             <a:fld id="{2D4AA6EA-0D90-46F4-B247-6A5A21F7EDC4}" type="datetimeFigureOut">
               <a:rPr lang="de-DE" smtClean="0"/>
-              <a:t>20.01.2016</a:t>
+              <a:t>23.01.2016</a:t>
             </a:fld>
             <a:endParaRPr lang="de-DE"/>
           </a:p>
@@ -1638,7 +1650,7 @@
           <a:p>
             <a:fld id="{2D4AA6EA-0D90-46F4-B247-6A5A21F7EDC4}" type="datetimeFigureOut">
               <a:rPr lang="de-DE" smtClean="0"/>
-              <a:t>20.01.2016</a:t>
+              <a:t>23.01.2016</a:t>
             </a:fld>
             <a:endParaRPr lang="de-DE"/>
           </a:p>
@@ -1756,7 +1768,7 @@
           <a:p>
             <a:fld id="{2D4AA6EA-0D90-46F4-B247-6A5A21F7EDC4}" type="datetimeFigureOut">
               <a:rPr lang="de-DE" smtClean="0"/>
-              <a:t>20.01.2016</a:t>
+              <a:t>23.01.2016</a:t>
             </a:fld>
             <a:endParaRPr lang="de-DE"/>
           </a:p>
@@ -1851,7 +1863,7 @@
           <a:p>
             <a:fld id="{2D4AA6EA-0D90-46F4-B247-6A5A21F7EDC4}" type="datetimeFigureOut">
               <a:rPr lang="de-DE" smtClean="0"/>
-              <a:t>20.01.2016</a:t>
+              <a:t>23.01.2016</a:t>
             </a:fld>
             <a:endParaRPr lang="de-DE"/>
           </a:p>
@@ -2128,7 +2140,7 @@
           <a:p>
             <a:fld id="{2D4AA6EA-0D90-46F4-B247-6A5A21F7EDC4}" type="datetimeFigureOut">
               <a:rPr lang="de-DE" smtClean="0"/>
-              <a:t>20.01.2016</a:t>
+              <a:t>23.01.2016</a:t>
             </a:fld>
             <a:endParaRPr lang="de-DE"/>
           </a:p>
@@ -2381,7 +2393,7 @@
           <a:p>
             <a:fld id="{2D4AA6EA-0D90-46F4-B247-6A5A21F7EDC4}" type="datetimeFigureOut">
               <a:rPr lang="de-DE" smtClean="0"/>
-              <a:t>20.01.2016</a:t>
+              <a:t>23.01.2016</a:t>
             </a:fld>
             <a:endParaRPr lang="de-DE"/>
           </a:p>
@@ -2594,7 +2606,7 @@
           <a:p>
             <a:fld id="{2D4AA6EA-0D90-46F4-B247-6A5A21F7EDC4}" type="datetimeFigureOut">
               <a:rPr lang="de-DE" smtClean="0"/>
-              <a:t>20.01.2016</a:t>
+              <a:t>23.01.2016</a:t>
             </a:fld>
             <a:endParaRPr lang="de-DE"/>
           </a:p>
@@ -3325,6 +3337,180 @@
 </p:sld>
 </file>
 
+<file path=ppt/slides/slide10.xml><?xml version="1.0" encoding="utf-8"?>
+<p:sld xmlns:a="http://schemas.openxmlformats.org/drawingml/2006/main" xmlns:r="http://schemas.openxmlformats.org/officeDocument/2006/relationships" xmlns:p="http://schemas.openxmlformats.org/presentationml/2006/main">
+  <p:cSld>
+    <p:spTree>
+      <p:nvGrpSpPr>
+        <p:cNvPr id="1" name=""/>
+        <p:cNvGrpSpPr/>
+        <p:nvPr/>
+      </p:nvGrpSpPr>
+      <p:grpSpPr>
+        <a:xfrm>
+          <a:off x="0" y="0"/>
+          <a:ext cx="0" cy="0"/>
+          <a:chOff x="0" y="0"/>
+          <a:chExt cx="0" cy="0"/>
+        </a:xfrm>
+      </p:grpSpPr>
+      <p:sp>
+        <p:nvSpPr>
+          <p:cNvPr id="2" name="Titel 1"/>
+          <p:cNvSpPr>
+            <a:spLocks noGrp="1"/>
+          </p:cNvSpPr>
+          <p:nvPr>
+            <p:ph type="title"/>
+          </p:nvPr>
+        </p:nvSpPr>
+        <p:spPr/>
+        <p:txBody>
+          <a:bodyPr/>
+          <a:lstStyle/>
+          <a:p>
+            <a:r>
+              <a:rPr lang="de-DE" dirty="0" smtClean="0"/>
+              <a:t>Performance</a:t>
+            </a:r>
+            <a:endParaRPr lang="de-DE" dirty="0"/>
+          </a:p>
+        </p:txBody>
+      </p:sp>
+      <p:sp>
+        <p:nvSpPr>
+          <p:cNvPr id="3" name="Inhaltsplatzhalter 2"/>
+          <p:cNvSpPr>
+            <a:spLocks noGrp="1"/>
+          </p:cNvSpPr>
+          <p:nvPr>
+            <p:ph idx="1"/>
+          </p:nvPr>
+        </p:nvSpPr>
+        <p:spPr>
+          <a:xfrm>
+            <a:off x="838200" y="1825625"/>
+            <a:ext cx="10298360" cy="3979639"/>
+          </a:xfrm>
+        </p:spPr>
+        <p:txBody>
+          <a:bodyPr/>
+          <a:lstStyle/>
+          <a:p>
+            <a:pPr marL="266700" lvl="1" indent="-266700">
+              <a:tabLst>
+                <a:tab pos="717550" algn="l"/>
+              </a:tabLst>
+            </a:pPr>
+            <a:endParaRPr lang="de-DE" sz="900" dirty="0"/>
+          </a:p>
+          <a:p>
+            <a:pPr marL="457200" lvl="1" indent="0">
+              <a:buNone/>
+            </a:pPr>
+            <a:endParaRPr lang="de-DE" dirty="0"/>
+          </a:p>
+          <a:p>
+            <a:pPr lvl="1"/>
+            <a:endParaRPr lang="de-DE" dirty="0"/>
+          </a:p>
+        </p:txBody>
+      </p:sp>
+    </p:spTree>
+    <p:extLst>
+      <p:ext uri="{BB962C8B-B14F-4D97-AF65-F5344CB8AC3E}">
+        <p14:creationId xmlns:p14="http://schemas.microsoft.com/office/powerpoint/2010/main" val="2286209995"/>
+      </p:ext>
+    </p:extLst>
+  </p:cSld>
+  <p:clrMapOvr>
+    <a:masterClrMapping/>
+  </p:clrMapOvr>
+  <p:timing>
+    <p:tnLst>
+      <p:par>
+        <p:cTn id="1" dur="indefinite" restart="never" nodeType="tmRoot"/>
+      </p:par>
+    </p:tnLst>
+  </p:timing>
+</p:sld>
+</file>
+
+<file path=ppt/slides/slide11.xml><?xml version="1.0" encoding="utf-8"?>
+<p:sld xmlns:a="http://schemas.openxmlformats.org/drawingml/2006/main" xmlns:r="http://schemas.openxmlformats.org/officeDocument/2006/relationships" xmlns:p="http://schemas.openxmlformats.org/presentationml/2006/main">
+  <p:cSld>
+    <p:spTree>
+      <p:nvGrpSpPr>
+        <p:cNvPr id="1" name=""/>
+        <p:cNvGrpSpPr/>
+        <p:nvPr/>
+      </p:nvGrpSpPr>
+      <p:grpSpPr>
+        <a:xfrm>
+          <a:off x="0" y="0"/>
+          <a:ext cx="0" cy="0"/>
+          <a:chOff x="0" y="0"/>
+          <a:chExt cx="0" cy="0"/>
+        </a:xfrm>
+      </p:grpSpPr>
+      <p:sp>
+        <p:nvSpPr>
+          <p:cNvPr id="2" name="Titel 1"/>
+          <p:cNvSpPr>
+            <a:spLocks noGrp="1"/>
+          </p:cNvSpPr>
+          <p:nvPr>
+            <p:ph type="title"/>
+          </p:nvPr>
+        </p:nvSpPr>
+        <p:spPr/>
+        <p:txBody>
+          <a:bodyPr/>
+          <a:lstStyle/>
+          <a:p>
+            <a:endParaRPr lang="de-DE" dirty="0"/>
+          </a:p>
+        </p:txBody>
+      </p:sp>
+      <p:sp>
+        <p:nvSpPr>
+          <p:cNvPr id="3" name="Inhaltsplatzhalter 2"/>
+          <p:cNvSpPr>
+            <a:spLocks noGrp="1"/>
+          </p:cNvSpPr>
+          <p:nvPr>
+            <p:ph idx="1"/>
+          </p:nvPr>
+        </p:nvSpPr>
+        <p:spPr/>
+        <p:txBody>
+          <a:bodyPr/>
+          <a:lstStyle/>
+          <a:p>
+            <a:endParaRPr lang="de-DE"/>
+          </a:p>
+        </p:txBody>
+      </p:sp>
+    </p:spTree>
+    <p:extLst>
+      <p:ext uri="{BB962C8B-B14F-4D97-AF65-F5344CB8AC3E}">
+        <p14:creationId xmlns:p14="http://schemas.microsoft.com/office/powerpoint/2010/main" val="790646626"/>
+      </p:ext>
+    </p:extLst>
+  </p:cSld>
+  <p:clrMapOvr>
+    <a:masterClrMapping/>
+  </p:clrMapOvr>
+  <p:timing>
+    <p:tnLst>
+      <p:par>
+        <p:cTn id="1" dur="indefinite" restart="never" nodeType="tmRoot"/>
+      </p:par>
+    </p:tnLst>
+  </p:timing>
+</p:sld>
+</file>
+
 <file path=ppt/slides/slide2.xml><?xml version="1.0" encoding="utf-8"?>
 <p:sld xmlns:a="http://schemas.openxmlformats.org/drawingml/2006/main" xmlns:r="http://schemas.openxmlformats.org/officeDocument/2006/relationships" xmlns:p="http://schemas.openxmlformats.org/presentationml/2006/main">
   <p:cSld>
@@ -3717,7 +3903,19 @@
           <a:bodyPr/>
           <a:lstStyle/>
           <a:p>
-            <a:endParaRPr lang="de-DE"/>
+            <a:r>
+              <a:rPr lang="de-DE" dirty="0" err="1" smtClean="0"/>
+              <a:t>Concept</a:t>
+            </a:r>
+            <a:r>
+              <a:rPr lang="de-DE" dirty="0" smtClean="0"/>
+              <a:t> </a:t>
+            </a:r>
+            <a:r>
+              <a:rPr lang="de-DE" dirty="0" smtClean="0"/>
+              <a:t>Model</a:t>
+            </a:r>
+            <a:endParaRPr lang="de-DE" dirty="0"/>
           </a:p>
         </p:txBody>
       </p:sp>
@@ -3736,7 +3934,333 @@
           <a:bodyPr/>
           <a:lstStyle/>
           <a:p>
-            <a:endParaRPr lang="de-DE"/>
+            <a:pPr marL="0" lvl="1" indent="0">
+              <a:buNone/>
+              <a:tabLst>
+                <a:tab pos="717550" algn="l"/>
+              </a:tabLst>
+            </a:pPr>
+            <a:r>
+              <a:rPr lang="de-DE" sz="2800" dirty="0" smtClean="0"/>
+              <a:t> </a:t>
+            </a:r>
+            <a:endParaRPr lang="de-DE" sz="2800" dirty="0"/>
+          </a:p>
+          <a:p>
+            <a:pPr marL="457200" lvl="1" indent="0">
+              <a:buNone/>
+            </a:pPr>
+            <a:endParaRPr lang="de-DE" dirty="0"/>
+          </a:p>
+          <a:p>
+            <a:pPr lvl="1"/>
+            <a:endParaRPr lang="de-DE" dirty="0"/>
+          </a:p>
+        </p:txBody>
+      </p:sp>
+      <p:pic>
+        <p:nvPicPr>
+          <p:cNvPr id="1026" name="Picture 2" descr="C:\Users\Gernot\Dropbox\Studium\SE\WS1516\Datenbanken\dbs\final_handins\assignment01\u01.png"/>
+          <p:cNvPicPr>
+            <a:picLocks noChangeAspect="1" noChangeArrowheads="1"/>
+          </p:cNvPicPr>
+          <p:nvPr/>
+        </p:nvPicPr>
+        <p:blipFill rotWithShape="1">
+          <a:blip r:embed="rId2">
+            <a:extLst>
+              <a:ext uri="{28A0092B-C50C-407E-A947-70E740481C1C}">
+                <a14:useLocalDpi xmlns:a14="http://schemas.microsoft.com/office/drawing/2010/main" val="0"/>
+              </a:ext>
+            </a:extLst>
+          </a:blip>
+          <a:srcRect l="1072"/>
+          <a:stretch/>
+        </p:blipFill>
+        <p:spPr bwMode="auto">
+          <a:xfrm>
+            <a:off x="4663440" y="476672"/>
+            <a:ext cx="7350215" cy="5235782"/>
+          </a:xfrm>
+          <a:prstGeom prst="rect">
+            <a:avLst/>
+          </a:prstGeom>
+          <a:noFill/>
+          <a:extLst>
+            <a:ext uri="{909E8E84-426E-40DD-AFC4-6F175D3DCCD1}">
+              <a14:hiddenFill xmlns:a14="http://schemas.microsoft.com/office/drawing/2010/main">
+                <a:solidFill>
+                  <a:srgbClr val="FFFFFF"/>
+                </a:solidFill>
+              </a14:hiddenFill>
+            </a:ext>
+          </a:extLst>
+        </p:spPr>
+      </p:pic>
+      <p:sp>
+        <p:nvSpPr>
+          <p:cNvPr id="6" name="Inhaltsplatzhalter 2"/>
+          <p:cNvSpPr txBox="1">
+            <a:spLocks/>
+          </p:cNvSpPr>
+          <p:nvPr/>
+        </p:nvSpPr>
+        <p:spPr>
+          <a:xfrm>
+            <a:off x="835552" y="1844824"/>
+            <a:ext cx="10515600" cy="3979639"/>
+          </a:xfrm>
+          <a:prstGeom prst="rect">
+            <a:avLst/>
+          </a:prstGeom>
+        </p:spPr>
+        <p:txBody>
+          <a:bodyPr vert="horz" lIns="91440" tIns="45720" rIns="91440" bIns="45720" rtlCol="0">
+            <a:normAutofit/>
+          </a:bodyPr>
+          <a:lstStyle>
+            <a:lvl1pPr marL="228600" indent="-228600" algn="l" defTabSz="914400" rtl="0" eaLnBrk="1" latinLnBrk="0" hangingPunct="1">
+              <a:lnSpc>
+                <a:spcPct val="90000"/>
+              </a:lnSpc>
+              <a:spcBef>
+                <a:spcPts val="1000"/>
+              </a:spcBef>
+              <a:buFont typeface="Arial" panose="020B0604020202020204" pitchFamily="34" charset="0"/>
+              <a:buChar char="•"/>
+              <a:defRPr sz="2800" kern="1200">
+                <a:solidFill>
+                  <a:schemeClr val="tx1"/>
+                </a:solidFill>
+                <a:latin typeface="+mn-lt"/>
+                <a:ea typeface="+mn-ea"/>
+                <a:cs typeface="+mn-cs"/>
+              </a:defRPr>
+            </a:lvl1pPr>
+            <a:lvl2pPr marL="685800" indent="-228600" algn="l" defTabSz="914400" rtl="0" eaLnBrk="1" latinLnBrk="0" hangingPunct="1">
+              <a:lnSpc>
+                <a:spcPct val="90000"/>
+              </a:lnSpc>
+              <a:spcBef>
+                <a:spcPts val="500"/>
+              </a:spcBef>
+              <a:buFont typeface="Arial" panose="020B0604020202020204" pitchFamily="34" charset="0"/>
+              <a:buChar char="•"/>
+              <a:defRPr sz="2400" kern="1200">
+                <a:solidFill>
+                  <a:schemeClr val="tx1"/>
+                </a:solidFill>
+                <a:latin typeface="+mn-lt"/>
+                <a:ea typeface="+mn-ea"/>
+                <a:cs typeface="+mn-cs"/>
+              </a:defRPr>
+            </a:lvl2pPr>
+            <a:lvl3pPr marL="1143000" indent="-228600" algn="l" defTabSz="914400" rtl="0" eaLnBrk="1" latinLnBrk="0" hangingPunct="1">
+              <a:lnSpc>
+                <a:spcPct val="90000"/>
+              </a:lnSpc>
+              <a:spcBef>
+                <a:spcPts val="500"/>
+              </a:spcBef>
+              <a:buFont typeface="Arial" panose="020B0604020202020204" pitchFamily="34" charset="0"/>
+              <a:buChar char="•"/>
+              <a:defRPr sz="2000" kern="1200">
+                <a:solidFill>
+                  <a:schemeClr val="tx1"/>
+                </a:solidFill>
+                <a:latin typeface="+mn-lt"/>
+                <a:ea typeface="+mn-ea"/>
+                <a:cs typeface="+mn-cs"/>
+              </a:defRPr>
+            </a:lvl3pPr>
+            <a:lvl4pPr marL="1600200" indent="-228600" algn="l" defTabSz="914400" rtl="0" eaLnBrk="1" latinLnBrk="0" hangingPunct="1">
+              <a:lnSpc>
+                <a:spcPct val="90000"/>
+              </a:lnSpc>
+              <a:spcBef>
+                <a:spcPts val="500"/>
+              </a:spcBef>
+              <a:buFont typeface="Arial" panose="020B0604020202020204" pitchFamily="34" charset="0"/>
+              <a:buChar char="•"/>
+              <a:defRPr sz="1800" kern="1200">
+                <a:solidFill>
+                  <a:schemeClr val="tx1"/>
+                </a:solidFill>
+                <a:latin typeface="+mn-lt"/>
+                <a:ea typeface="+mn-ea"/>
+                <a:cs typeface="+mn-cs"/>
+              </a:defRPr>
+            </a:lvl4pPr>
+            <a:lvl5pPr marL="2057400" indent="-228600" algn="l" defTabSz="914400" rtl="0" eaLnBrk="1" latinLnBrk="0" hangingPunct="1">
+              <a:lnSpc>
+                <a:spcPct val="90000"/>
+              </a:lnSpc>
+              <a:spcBef>
+                <a:spcPts val="500"/>
+              </a:spcBef>
+              <a:buFont typeface="Arial" panose="020B0604020202020204" pitchFamily="34" charset="0"/>
+              <a:buChar char="•"/>
+              <a:defRPr sz="1800" kern="1200">
+                <a:solidFill>
+                  <a:schemeClr val="tx1"/>
+                </a:solidFill>
+                <a:latin typeface="+mn-lt"/>
+                <a:ea typeface="+mn-ea"/>
+                <a:cs typeface="+mn-cs"/>
+              </a:defRPr>
+            </a:lvl5pPr>
+            <a:lvl6pPr marL="2514600" indent="-228600" algn="l" defTabSz="914400" rtl="0" eaLnBrk="1" latinLnBrk="0" hangingPunct="1">
+              <a:lnSpc>
+                <a:spcPct val="90000"/>
+              </a:lnSpc>
+              <a:spcBef>
+                <a:spcPts val="500"/>
+              </a:spcBef>
+              <a:buFont typeface="Arial" panose="020B0604020202020204" pitchFamily="34" charset="0"/>
+              <a:buChar char="•"/>
+              <a:defRPr sz="1800" kern="1200">
+                <a:solidFill>
+                  <a:schemeClr val="tx1"/>
+                </a:solidFill>
+                <a:latin typeface="+mn-lt"/>
+                <a:ea typeface="+mn-ea"/>
+                <a:cs typeface="+mn-cs"/>
+              </a:defRPr>
+            </a:lvl6pPr>
+            <a:lvl7pPr marL="2971800" indent="-228600" algn="l" defTabSz="914400" rtl="0" eaLnBrk="1" latinLnBrk="0" hangingPunct="1">
+              <a:lnSpc>
+                <a:spcPct val="90000"/>
+              </a:lnSpc>
+              <a:spcBef>
+                <a:spcPts val="500"/>
+              </a:spcBef>
+              <a:buFont typeface="Arial" panose="020B0604020202020204" pitchFamily="34" charset="0"/>
+              <a:buChar char="•"/>
+              <a:defRPr sz="1800" kern="1200">
+                <a:solidFill>
+                  <a:schemeClr val="tx1"/>
+                </a:solidFill>
+                <a:latin typeface="+mn-lt"/>
+                <a:ea typeface="+mn-ea"/>
+                <a:cs typeface="+mn-cs"/>
+              </a:defRPr>
+            </a:lvl7pPr>
+            <a:lvl8pPr marL="3429000" indent="-228600" algn="l" defTabSz="914400" rtl="0" eaLnBrk="1" latinLnBrk="0" hangingPunct="1">
+              <a:lnSpc>
+                <a:spcPct val="90000"/>
+              </a:lnSpc>
+              <a:spcBef>
+                <a:spcPts val="500"/>
+              </a:spcBef>
+              <a:buFont typeface="Arial" panose="020B0604020202020204" pitchFamily="34" charset="0"/>
+              <a:buChar char="•"/>
+              <a:defRPr sz="1800" kern="1200">
+                <a:solidFill>
+                  <a:schemeClr val="tx1"/>
+                </a:solidFill>
+                <a:latin typeface="+mn-lt"/>
+                <a:ea typeface="+mn-ea"/>
+                <a:cs typeface="+mn-cs"/>
+              </a:defRPr>
+            </a:lvl8pPr>
+            <a:lvl9pPr marL="3886200" indent="-228600" algn="l" defTabSz="914400" rtl="0" eaLnBrk="1" latinLnBrk="0" hangingPunct="1">
+              <a:lnSpc>
+                <a:spcPct val="90000"/>
+              </a:lnSpc>
+              <a:spcBef>
+                <a:spcPts val="500"/>
+              </a:spcBef>
+              <a:buFont typeface="Arial" panose="020B0604020202020204" pitchFamily="34" charset="0"/>
+              <a:buChar char="•"/>
+              <a:defRPr sz="1800" kern="1200">
+                <a:solidFill>
+                  <a:schemeClr val="tx1"/>
+                </a:solidFill>
+                <a:latin typeface="+mn-lt"/>
+                <a:ea typeface="+mn-ea"/>
+                <a:cs typeface="+mn-cs"/>
+              </a:defRPr>
+            </a:lvl9pPr>
+          </a:lstStyle>
+          <a:p>
+            <a:r>
+              <a:rPr lang="de-DE" b="1" dirty="0" smtClean="0"/>
+              <a:t>Goal:</a:t>
+            </a:r>
+          </a:p>
+          <a:p>
+            <a:pPr marL="266700" indent="0">
+              <a:buNone/>
+            </a:pPr>
+            <a:r>
+              <a:rPr lang="de-DE" dirty="0" err="1" smtClean="0"/>
+              <a:t>detailed</a:t>
+            </a:r>
+            <a:r>
+              <a:rPr lang="de-DE" dirty="0" smtClean="0"/>
+              <a:t> </a:t>
+            </a:r>
+            <a:r>
+              <a:rPr lang="de-DE" dirty="0" err="1" smtClean="0"/>
+              <a:t>modelling</a:t>
+            </a:r>
+            <a:r>
+              <a:rPr lang="de-DE" dirty="0" smtClean="0"/>
+              <a:t> </a:t>
+            </a:r>
+          </a:p>
+          <a:p>
+            <a:pPr marL="266700" indent="0">
+              <a:buNone/>
+            </a:pPr>
+            <a:r>
+              <a:rPr lang="de-DE" dirty="0" err="1" smtClean="0"/>
+              <a:t>of</a:t>
+            </a:r>
+            <a:r>
+              <a:rPr lang="de-DE" dirty="0" smtClean="0"/>
+              <a:t> </a:t>
+            </a:r>
+            <a:r>
+              <a:rPr lang="de-DE" dirty="0" err="1" smtClean="0"/>
+              <a:t>the</a:t>
+            </a:r>
+            <a:r>
+              <a:rPr lang="de-DE" dirty="0" smtClean="0"/>
+              <a:t> real </a:t>
+            </a:r>
+            <a:r>
+              <a:rPr lang="de-DE" dirty="0" err="1" smtClean="0"/>
+              <a:t>world</a:t>
+            </a:r>
+            <a:r>
+              <a:rPr lang="de-DE" dirty="0" smtClean="0"/>
+              <a:t> </a:t>
+            </a:r>
+            <a:r>
+              <a:rPr lang="de-DE" dirty="0" err="1" smtClean="0"/>
+              <a:t>domain</a:t>
+            </a:r>
+            <a:endParaRPr lang="de-DE" dirty="0" smtClean="0"/>
+          </a:p>
+          <a:p>
+            <a:pPr marL="266700" lvl="1" indent="-266700">
+              <a:tabLst>
+                <a:tab pos="717550" algn="l"/>
+              </a:tabLst>
+            </a:pPr>
+            <a:endParaRPr lang="de-DE" sz="2800" dirty="0" smtClean="0"/>
+          </a:p>
+          <a:p>
+            <a:pPr marL="457200" lvl="1" indent="0">
+              <a:buFont typeface="Arial" panose="020B0604020202020204" pitchFamily="34" charset="0"/>
+              <a:buNone/>
+            </a:pPr>
+            <a:endParaRPr lang="de-DE" dirty="0" smtClean="0"/>
+          </a:p>
+          <a:p>
+            <a:pPr lvl="1"/>
+            <a:endParaRPr lang="de-DE" dirty="0"/>
           </a:p>
         </p:txBody>
       </p:sp>
@@ -3761,6 +4285,2386 @@
 </file>
 
 <file path=ppt/slides/slide4.xml><?xml version="1.0" encoding="utf-8"?>
+<p:sld xmlns:a="http://schemas.openxmlformats.org/drawingml/2006/main" xmlns:r="http://schemas.openxmlformats.org/officeDocument/2006/relationships" xmlns:p="http://schemas.openxmlformats.org/presentationml/2006/main">
+  <p:cSld>
+    <p:spTree>
+      <p:nvGrpSpPr>
+        <p:cNvPr id="1" name=""/>
+        <p:cNvGrpSpPr/>
+        <p:nvPr/>
+      </p:nvGrpSpPr>
+      <p:grpSpPr>
+        <a:xfrm>
+          <a:off x="0" y="0"/>
+          <a:ext cx="0" cy="0"/>
+          <a:chOff x="0" y="0"/>
+          <a:chExt cx="0" cy="0"/>
+        </a:xfrm>
+      </p:grpSpPr>
+      <p:sp>
+        <p:nvSpPr>
+          <p:cNvPr id="2" name="Titel 1"/>
+          <p:cNvSpPr>
+            <a:spLocks noGrp="1"/>
+          </p:cNvSpPr>
+          <p:nvPr>
+            <p:ph type="title"/>
+          </p:nvPr>
+        </p:nvSpPr>
+        <p:spPr/>
+        <p:txBody>
+          <a:bodyPr/>
+          <a:lstStyle/>
+          <a:p>
+            <a:r>
+              <a:rPr lang="de-DE" dirty="0" err="1" smtClean="0"/>
+              <a:t>Concept</a:t>
+            </a:r>
+            <a:r>
+              <a:rPr lang="de-DE" dirty="0" smtClean="0"/>
+              <a:t> Model</a:t>
+            </a:r>
+            <a:endParaRPr lang="de-DE" dirty="0"/>
+          </a:p>
+        </p:txBody>
+      </p:sp>
+      <p:sp>
+        <p:nvSpPr>
+          <p:cNvPr id="3" name="Inhaltsplatzhalter 2"/>
+          <p:cNvSpPr>
+            <a:spLocks noGrp="1"/>
+          </p:cNvSpPr>
+          <p:nvPr>
+            <p:ph idx="1"/>
+          </p:nvPr>
+        </p:nvSpPr>
+        <p:spPr/>
+        <p:txBody>
+          <a:bodyPr/>
+          <a:lstStyle/>
+          <a:p>
+            <a:r>
+              <a:rPr lang="de-DE" dirty="0" smtClean="0"/>
+              <a:t>Wahlkreise </a:t>
+            </a:r>
+            <a:r>
+              <a:rPr lang="de-DE" dirty="0" err="1" smtClean="0"/>
+              <a:t>divided</a:t>
+            </a:r>
+            <a:r>
+              <a:rPr lang="de-DE" dirty="0" smtClean="0"/>
+              <a:t> in</a:t>
+            </a:r>
+          </a:p>
+          <a:p>
+            <a:pPr marL="358775" lvl="1" indent="-185738"/>
+            <a:r>
+              <a:rPr lang="de-DE" b="1" dirty="0" smtClean="0"/>
+              <a:t>Direktwahlbezirke </a:t>
+            </a:r>
+          </a:p>
+          <a:p>
+            <a:pPr marL="358775" lvl="1" indent="-185738">
+              <a:buNone/>
+              <a:tabLst>
+                <a:tab pos="717550" algn="l"/>
+              </a:tabLst>
+            </a:pPr>
+            <a:r>
+              <a:rPr lang="de-DE" dirty="0" smtClean="0"/>
+              <a:t>	(</a:t>
+            </a:r>
+            <a:r>
+              <a:rPr lang="de-DE" dirty="0" err="1" smtClean="0"/>
+              <a:t>ballout</a:t>
+            </a:r>
+            <a:r>
+              <a:rPr lang="de-DE" dirty="0" smtClean="0"/>
+              <a:t> box </a:t>
+            </a:r>
+            <a:r>
+              <a:rPr lang="de-DE" dirty="0" err="1" smtClean="0"/>
+              <a:t>voting</a:t>
+            </a:r>
+            <a:r>
+              <a:rPr lang="de-DE" dirty="0" smtClean="0"/>
+              <a:t>)</a:t>
+            </a:r>
+          </a:p>
+          <a:p>
+            <a:pPr marL="358775" lvl="1" indent="-185738"/>
+            <a:r>
+              <a:rPr lang="de-DE" b="1" dirty="0" smtClean="0"/>
+              <a:t>Briefwahlbezirke</a:t>
+            </a:r>
+            <a:endParaRPr lang="de-DE" b="1" dirty="0"/>
+          </a:p>
+          <a:p>
+            <a:pPr marL="358775" lvl="1" indent="-185738">
+              <a:buNone/>
+              <a:tabLst>
+                <a:tab pos="717550" algn="l"/>
+              </a:tabLst>
+            </a:pPr>
+            <a:r>
+              <a:rPr lang="de-DE" dirty="0"/>
+              <a:t>	</a:t>
+            </a:r>
+            <a:r>
+              <a:rPr lang="de-DE" dirty="0" smtClean="0"/>
+              <a:t>(</a:t>
+            </a:r>
+            <a:r>
+              <a:rPr lang="de-DE" dirty="0" err="1" smtClean="0"/>
+              <a:t>absentee</a:t>
+            </a:r>
+            <a:r>
+              <a:rPr lang="de-DE" dirty="0" smtClean="0"/>
+              <a:t> </a:t>
+            </a:r>
+            <a:r>
+              <a:rPr lang="de-DE" dirty="0" err="1"/>
+              <a:t>voting</a:t>
+            </a:r>
+            <a:r>
+              <a:rPr lang="de-DE" dirty="0" smtClean="0"/>
+              <a:t>)</a:t>
+            </a:r>
+          </a:p>
+          <a:p>
+            <a:pPr marL="266700" lvl="1" indent="-266700">
+              <a:tabLst>
+                <a:tab pos="717550" algn="l"/>
+              </a:tabLst>
+            </a:pPr>
+            <a:endParaRPr lang="de-DE" sz="2800" dirty="0"/>
+          </a:p>
+          <a:p>
+            <a:pPr marL="457200" lvl="1" indent="0">
+              <a:buNone/>
+            </a:pPr>
+            <a:endParaRPr lang="de-DE" dirty="0"/>
+          </a:p>
+          <a:p>
+            <a:pPr lvl="1"/>
+            <a:endParaRPr lang="de-DE" dirty="0"/>
+          </a:p>
+        </p:txBody>
+      </p:sp>
+      <p:pic>
+        <p:nvPicPr>
+          <p:cNvPr id="1026" name="Picture 2" descr="C:\Users\Gernot\Dropbox\Studium\SE\WS1516\Datenbanken\dbs\final_handins\assignment01\u01.png"/>
+          <p:cNvPicPr>
+            <a:picLocks noChangeAspect="1" noChangeArrowheads="1"/>
+          </p:cNvPicPr>
+          <p:nvPr/>
+        </p:nvPicPr>
+        <p:blipFill rotWithShape="1">
+          <a:blip r:embed="rId2">
+            <a:extLst>
+              <a:ext uri="{28A0092B-C50C-407E-A947-70E740481C1C}">
+                <a14:useLocalDpi xmlns:a14="http://schemas.microsoft.com/office/drawing/2010/main" val="0"/>
+              </a:ext>
+            </a:extLst>
+          </a:blip>
+          <a:srcRect l="33783" t="53556" r="4364" b="1"/>
+          <a:stretch/>
+        </p:blipFill>
+        <p:spPr bwMode="auto">
+          <a:xfrm>
+            <a:off x="4727848" y="1628800"/>
+            <a:ext cx="7272808" cy="3848290"/>
+          </a:xfrm>
+          <a:prstGeom prst="rect">
+            <a:avLst/>
+          </a:prstGeom>
+          <a:noFill/>
+          <a:extLst>
+            <a:ext uri="{909E8E84-426E-40DD-AFC4-6F175D3DCCD1}">
+              <a14:hiddenFill xmlns:a14="http://schemas.microsoft.com/office/drawing/2010/main">
+                <a:solidFill>
+                  <a:srgbClr val="FFFFFF"/>
+                </a:solidFill>
+              </a14:hiddenFill>
+            </a:ext>
+          </a:extLst>
+        </p:spPr>
+      </p:pic>
+    </p:spTree>
+    <p:extLst>
+      <p:ext uri="{BB962C8B-B14F-4D97-AF65-F5344CB8AC3E}">
+        <p14:creationId xmlns:p14="http://schemas.microsoft.com/office/powerpoint/2010/main" val="2787826303"/>
+      </p:ext>
+    </p:extLst>
+  </p:cSld>
+  <p:clrMapOvr>
+    <a:masterClrMapping/>
+  </p:clrMapOvr>
+  <p:timing>
+    <p:tnLst>
+      <p:par>
+        <p:cTn id="1" dur="indefinite" restart="never" nodeType="tmRoot"/>
+      </p:par>
+    </p:tnLst>
+  </p:timing>
+</p:sld>
+</file>
+
+<file path=ppt/slides/slide5.xml><?xml version="1.0" encoding="utf-8"?>
+<p:sld xmlns:a="http://schemas.openxmlformats.org/drawingml/2006/main" xmlns:r="http://schemas.openxmlformats.org/officeDocument/2006/relationships" xmlns:p="http://schemas.openxmlformats.org/presentationml/2006/main">
+  <p:cSld>
+    <p:spTree>
+      <p:nvGrpSpPr>
+        <p:cNvPr id="1" name=""/>
+        <p:cNvGrpSpPr/>
+        <p:nvPr/>
+      </p:nvGrpSpPr>
+      <p:grpSpPr>
+        <a:xfrm>
+          <a:off x="0" y="0"/>
+          <a:ext cx="0" cy="0"/>
+          <a:chOff x="0" y="0"/>
+          <a:chExt cx="0" cy="0"/>
+        </a:xfrm>
+      </p:grpSpPr>
+      <p:sp>
+        <p:nvSpPr>
+          <p:cNvPr id="2" name="Titel 1"/>
+          <p:cNvSpPr>
+            <a:spLocks noGrp="1"/>
+          </p:cNvSpPr>
+          <p:nvPr>
+            <p:ph type="title"/>
+          </p:nvPr>
+        </p:nvSpPr>
+        <p:spPr/>
+        <p:txBody>
+          <a:bodyPr/>
+          <a:lstStyle/>
+          <a:p>
+            <a:r>
+              <a:rPr lang="de-DE" dirty="0" err="1" smtClean="0"/>
+              <a:t>Concept</a:t>
+            </a:r>
+            <a:r>
+              <a:rPr lang="de-DE" dirty="0" smtClean="0"/>
+              <a:t> Model</a:t>
+            </a:r>
+            <a:endParaRPr lang="de-DE" dirty="0"/>
+          </a:p>
+        </p:txBody>
+      </p:sp>
+      <p:sp>
+        <p:nvSpPr>
+          <p:cNvPr id="3" name="Inhaltsplatzhalter 2"/>
+          <p:cNvSpPr>
+            <a:spLocks noGrp="1"/>
+          </p:cNvSpPr>
+          <p:nvPr>
+            <p:ph idx="1"/>
+          </p:nvPr>
+        </p:nvSpPr>
+        <p:spPr>
+          <a:xfrm>
+            <a:off x="838200" y="1825625"/>
+            <a:ext cx="3817640" cy="3979639"/>
+          </a:xfrm>
+        </p:spPr>
+        <p:txBody>
+          <a:bodyPr/>
+          <a:lstStyle/>
+          <a:p>
+            <a:r>
+              <a:rPr lang="de-DE" dirty="0" smtClean="0"/>
+              <a:t>Partys </a:t>
+            </a:r>
+            <a:r>
+              <a:rPr lang="de-DE" dirty="0" err="1" smtClean="0"/>
+              <a:t>can</a:t>
+            </a:r>
+            <a:r>
+              <a:rPr lang="de-DE" dirty="0" smtClean="0"/>
+              <a:t> </a:t>
+            </a:r>
+            <a:r>
+              <a:rPr lang="de-DE" dirty="0" err="1" smtClean="0"/>
+              <a:t>be</a:t>
+            </a:r>
+            <a:r>
+              <a:rPr lang="de-DE" dirty="0" smtClean="0"/>
+              <a:t> </a:t>
+            </a:r>
+            <a:r>
+              <a:rPr lang="de-DE" b="1" dirty="0" err="1" smtClean="0"/>
+              <a:t>minority</a:t>
+            </a:r>
+            <a:r>
+              <a:rPr lang="de-DE" b="1" dirty="0" smtClean="0"/>
+              <a:t> </a:t>
+            </a:r>
+            <a:r>
+              <a:rPr lang="de-DE" b="1" dirty="0" err="1" smtClean="0"/>
+              <a:t>parties</a:t>
+            </a:r>
+            <a:endParaRPr lang="de-DE" b="1" dirty="0" smtClean="0"/>
+          </a:p>
+          <a:p>
+            <a:r>
+              <a:rPr lang="de-DE" dirty="0" smtClean="0">
+                <a:sym typeface="Wingdings" panose="05000000000000000000" pitchFamily="2" charset="2"/>
+              </a:rPr>
+              <a:t> </a:t>
+            </a:r>
+            <a:r>
+              <a:rPr lang="de-DE" dirty="0" err="1" smtClean="0">
+                <a:sym typeface="Wingdings" panose="05000000000000000000" pitchFamily="2" charset="2"/>
+              </a:rPr>
+              <a:t>ability</a:t>
+            </a:r>
+            <a:r>
+              <a:rPr lang="de-DE" dirty="0" smtClean="0">
+                <a:sym typeface="Wingdings" panose="05000000000000000000" pitchFamily="2" charset="2"/>
+              </a:rPr>
+              <a:t> </a:t>
+            </a:r>
+            <a:r>
+              <a:rPr lang="de-DE" dirty="0" err="1" smtClean="0">
+                <a:sym typeface="Wingdings" panose="05000000000000000000" pitchFamily="2" charset="2"/>
+              </a:rPr>
+              <a:t>to</a:t>
+            </a:r>
+            <a:r>
+              <a:rPr lang="de-DE" dirty="0" smtClean="0">
+                <a:sym typeface="Wingdings" panose="05000000000000000000" pitchFamily="2" charset="2"/>
+              </a:rPr>
+              <a:t> </a:t>
+            </a:r>
+            <a:r>
+              <a:rPr lang="de-DE" dirty="0" err="1" smtClean="0">
+                <a:sym typeface="Wingdings" panose="05000000000000000000" pitchFamily="2" charset="2"/>
+              </a:rPr>
+              <a:t>relaize</a:t>
+            </a:r>
+            <a:r>
+              <a:rPr lang="de-DE" dirty="0" smtClean="0">
+                <a:sym typeface="Wingdings" panose="05000000000000000000" pitchFamily="2" charset="2"/>
+              </a:rPr>
+              <a:t> </a:t>
+            </a:r>
+            <a:r>
+              <a:rPr lang="de-DE" dirty="0" err="1" smtClean="0">
+                <a:sym typeface="Wingdings" panose="05000000000000000000" pitchFamily="2" charset="2"/>
+              </a:rPr>
+              <a:t>the</a:t>
+            </a:r>
+            <a:r>
+              <a:rPr lang="de-DE" dirty="0" smtClean="0">
+                <a:sym typeface="Wingdings" panose="05000000000000000000" pitchFamily="2" charset="2"/>
+              </a:rPr>
+              <a:t> Sperrklausel</a:t>
+            </a:r>
+            <a:endParaRPr lang="de-DE" dirty="0" smtClean="0"/>
+          </a:p>
+          <a:p>
+            <a:pPr marL="266700" lvl="1" indent="-266700">
+              <a:tabLst>
+                <a:tab pos="717550" algn="l"/>
+              </a:tabLst>
+            </a:pPr>
+            <a:endParaRPr lang="de-DE" sz="2800" dirty="0"/>
+          </a:p>
+          <a:p>
+            <a:pPr marL="457200" lvl="1" indent="0">
+              <a:buNone/>
+            </a:pPr>
+            <a:endParaRPr lang="de-DE" dirty="0"/>
+          </a:p>
+          <a:p>
+            <a:pPr lvl="1"/>
+            <a:endParaRPr lang="de-DE" dirty="0"/>
+          </a:p>
+        </p:txBody>
+      </p:sp>
+      <p:pic>
+        <p:nvPicPr>
+          <p:cNvPr id="1026" name="Picture 2" descr="C:\Users\Gernot\Dropbox\Studium\SE\WS1516\Datenbanken\dbs\final_handins\assignment01\u01.png"/>
+          <p:cNvPicPr>
+            <a:picLocks noChangeAspect="1" noChangeArrowheads="1"/>
+          </p:cNvPicPr>
+          <p:nvPr/>
+        </p:nvPicPr>
+        <p:blipFill rotWithShape="1">
+          <a:blip r:embed="rId2">
+            <a:extLst>
+              <a:ext uri="{28A0092B-C50C-407E-A947-70E740481C1C}">
+                <a14:useLocalDpi xmlns:a14="http://schemas.microsoft.com/office/drawing/2010/main" val="0"/>
+              </a:ext>
+            </a:extLst>
+          </a:blip>
+          <a:srcRect l="51489" t="10028" r="7209" b="43529"/>
+          <a:stretch/>
+        </p:blipFill>
+        <p:spPr bwMode="auto">
+          <a:xfrm>
+            <a:off x="5519936" y="1405032"/>
+            <a:ext cx="4856480" cy="3848290"/>
+          </a:xfrm>
+          <a:prstGeom prst="rect">
+            <a:avLst/>
+          </a:prstGeom>
+          <a:noFill/>
+          <a:extLst>
+            <a:ext uri="{909E8E84-426E-40DD-AFC4-6F175D3DCCD1}">
+              <a14:hiddenFill xmlns:a14="http://schemas.microsoft.com/office/drawing/2010/main">
+                <a:solidFill>
+                  <a:srgbClr val="FFFFFF"/>
+                </a:solidFill>
+              </a14:hiddenFill>
+            </a:ext>
+          </a:extLst>
+        </p:spPr>
+      </p:pic>
+    </p:spTree>
+    <p:extLst>
+      <p:ext uri="{BB962C8B-B14F-4D97-AF65-F5344CB8AC3E}">
+        <p14:creationId xmlns:p14="http://schemas.microsoft.com/office/powerpoint/2010/main" val="4082550761"/>
+      </p:ext>
+    </p:extLst>
+  </p:cSld>
+  <p:clrMapOvr>
+    <a:masterClrMapping/>
+  </p:clrMapOvr>
+  <p:timing>
+    <p:tnLst>
+      <p:par>
+        <p:cTn id="1" dur="indefinite" restart="never" nodeType="tmRoot"/>
+      </p:par>
+    </p:tnLst>
+  </p:timing>
+</p:sld>
+</file>
+
+<file path=ppt/slides/slide6.xml><?xml version="1.0" encoding="utf-8"?>
+<p:sld xmlns:a="http://schemas.openxmlformats.org/drawingml/2006/main" xmlns:r="http://schemas.openxmlformats.org/officeDocument/2006/relationships" xmlns:p="http://schemas.openxmlformats.org/presentationml/2006/main">
+  <p:cSld>
+    <p:spTree>
+      <p:nvGrpSpPr>
+        <p:cNvPr id="1" name=""/>
+        <p:cNvGrpSpPr/>
+        <p:nvPr/>
+      </p:nvGrpSpPr>
+      <p:grpSpPr>
+        <a:xfrm>
+          <a:off x="0" y="0"/>
+          <a:ext cx="0" cy="0"/>
+          <a:chOff x="0" y="0"/>
+          <a:chExt cx="0" cy="0"/>
+        </a:xfrm>
+      </p:grpSpPr>
+      <p:sp>
+        <p:nvSpPr>
+          <p:cNvPr id="2" name="Titel 1"/>
+          <p:cNvSpPr>
+            <a:spLocks noGrp="1"/>
+          </p:cNvSpPr>
+          <p:nvPr>
+            <p:ph type="title"/>
+          </p:nvPr>
+        </p:nvSpPr>
+        <p:spPr/>
+        <p:txBody>
+          <a:bodyPr/>
+          <a:lstStyle/>
+          <a:p>
+            <a:r>
+              <a:rPr lang="de-DE" dirty="0" err="1" smtClean="0"/>
+              <a:t>Result</a:t>
+            </a:r>
+            <a:r>
+              <a:rPr lang="de-DE" dirty="0" smtClean="0"/>
+              <a:t> </a:t>
+            </a:r>
+            <a:r>
+              <a:rPr lang="de-DE" dirty="0" err="1" smtClean="0"/>
+              <a:t>Calculation</a:t>
+            </a:r>
+            <a:endParaRPr lang="de-DE" dirty="0"/>
+          </a:p>
+        </p:txBody>
+      </p:sp>
+      <p:sp>
+        <p:nvSpPr>
+          <p:cNvPr id="3" name="Inhaltsplatzhalter 2"/>
+          <p:cNvSpPr>
+            <a:spLocks noGrp="1"/>
+          </p:cNvSpPr>
+          <p:nvPr>
+            <p:ph idx="1"/>
+          </p:nvPr>
+        </p:nvSpPr>
+        <p:spPr>
+          <a:xfrm>
+            <a:off x="838200" y="1825625"/>
+            <a:ext cx="10298360" cy="3979639"/>
+          </a:xfrm>
+        </p:spPr>
+        <p:txBody>
+          <a:bodyPr/>
+          <a:lstStyle/>
+          <a:p>
+            <a:pPr marL="266700" lvl="1" indent="-266700">
+              <a:tabLst>
+                <a:tab pos="717550" algn="l"/>
+              </a:tabLst>
+            </a:pPr>
+            <a:r>
+              <a:rPr lang="de-DE" sz="2800" dirty="0" err="1" smtClean="0"/>
+              <a:t>Results</a:t>
+            </a:r>
+            <a:r>
+              <a:rPr lang="de-DE" sz="2800" dirty="0" smtClean="0"/>
+              <a:t> </a:t>
+            </a:r>
+            <a:r>
+              <a:rPr lang="de-DE" sz="2800" dirty="0" err="1" smtClean="0"/>
+              <a:t>are</a:t>
+            </a:r>
+            <a:r>
+              <a:rPr lang="de-DE" sz="2800" dirty="0" smtClean="0"/>
+              <a:t> </a:t>
+            </a:r>
+            <a:r>
+              <a:rPr lang="de-DE" sz="2800" dirty="0" err="1" smtClean="0"/>
+              <a:t>calculated</a:t>
+            </a:r>
+            <a:r>
+              <a:rPr lang="de-DE" sz="2800" dirty="0" smtClean="0"/>
+              <a:t> </a:t>
+            </a:r>
+            <a:r>
+              <a:rPr lang="de-DE" sz="2800" dirty="0" err="1" smtClean="0"/>
+              <a:t>by</a:t>
+            </a:r>
+            <a:r>
+              <a:rPr lang="de-DE" sz="2800" dirty="0" smtClean="0"/>
+              <a:t> pure SQL (</a:t>
+            </a:r>
+            <a:r>
+              <a:rPr lang="de-DE" sz="2800" dirty="0" err="1" smtClean="0"/>
+              <a:t>stored</a:t>
+            </a:r>
+            <a:r>
+              <a:rPr lang="de-DE" sz="2800" dirty="0" smtClean="0"/>
+              <a:t> </a:t>
+            </a:r>
+            <a:r>
+              <a:rPr lang="de-DE" sz="2800" dirty="0" err="1" smtClean="0"/>
+              <a:t>procedures</a:t>
+            </a:r>
+            <a:r>
+              <a:rPr lang="de-DE" sz="2800" dirty="0" smtClean="0"/>
+              <a:t>)</a:t>
+            </a:r>
+          </a:p>
+          <a:p>
+            <a:pPr marL="266700" lvl="1" indent="-266700">
+              <a:tabLst>
+                <a:tab pos="717550" algn="l"/>
+              </a:tabLst>
+            </a:pPr>
+            <a:endParaRPr lang="de-DE" sz="1000" dirty="0" smtClean="0"/>
+          </a:p>
+          <a:p>
+            <a:pPr marL="266700" lvl="1" indent="-266700">
+              <a:tabLst>
+                <a:tab pos="717550" algn="l"/>
+              </a:tabLst>
+            </a:pPr>
+            <a:r>
+              <a:rPr lang="en-GB" sz="2800" dirty="0" smtClean="0"/>
+              <a:t>Use of the </a:t>
+            </a:r>
+            <a:r>
+              <a:rPr lang="de-AT" sz="2800" dirty="0" smtClean="0"/>
+              <a:t>Höchstzahlverfahren</a:t>
+            </a:r>
+          </a:p>
+          <a:p>
+            <a:pPr marL="723900" lvl="2" indent="-266700">
+              <a:tabLst>
+                <a:tab pos="717550" algn="l"/>
+              </a:tabLst>
+            </a:pPr>
+            <a:r>
+              <a:rPr lang="de-DE" dirty="0" smtClean="0"/>
+              <a:t>Can </a:t>
+            </a:r>
+            <a:r>
+              <a:rPr lang="de-DE" dirty="0" err="1" smtClean="0"/>
+              <a:t>be</a:t>
+            </a:r>
+            <a:r>
+              <a:rPr lang="de-DE" dirty="0" smtClean="0"/>
+              <a:t> </a:t>
+            </a:r>
+            <a:r>
+              <a:rPr lang="de-DE" dirty="0" err="1" smtClean="0"/>
+              <a:t>easily</a:t>
+            </a:r>
+            <a:r>
+              <a:rPr lang="de-DE" dirty="0" smtClean="0"/>
+              <a:t> </a:t>
+            </a:r>
+            <a:r>
+              <a:rPr lang="de-DE" dirty="0" err="1" smtClean="0"/>
+              <a:t>realized</a:t>
+            </a:r>
+            <a:r>
+              <a:rPr lang="de-DE" dirty="0" smtClean="0"/>
+              <a:t> </a:t>
+            </a:r>
+            <a:r>
+              <a:rPr lang="de-DE" dirty="0" err="1" smtClean="0"/>
+              <a:t>with</a:t>
+            </a:r>
+            <a:r>
+              <a:rPr lang="de-DE" dirty="0" smtClean="0"/>
+              <a:t> </a:t>
+            </a:r>
+            <a:r>
+              <a:rPr lang="de-DE" dirty="0" err="1" smtClean="0"/>
+              <a:t>window</a:t>
+            </a:r>
+            <a:r>
+              <a:rPr lang="de-DE" dirty="0" smtClean="0"/>
+              <a:t> </a:t>
+            </a:r>
+            <a:r>
+              <a:rPr lang="de-DE" dirty="0" err="1" smtClean="0"/>
+              <a:t>functions</a:t>
+            </a:r>
+            <a:endParaRPr lang="de-AT" dirty="0" smtClean="0"/>
+          </a:p>
+          <a:p>
+            <a:pPr marL="723900" lvl="2" indent="-266700">
+              <a:tabLst>
+                <a:tab pos="717550" algn="l"/>
+              </a:tabLst>
+            </a:pPr>
+            <a:r>
+              <a:rPr lang="en-GB" dirty="0" smtClean="0"/>
+              <a:t>No procedures needed to find divisor as with the </a:t>
+            </a:r>
+            <a:r>
+              <a:rPr lang="de-AT" dirty="0" err="1" smtClean="0"/>
+              <a:t>Divisorverfahren</a:t>
+            </a:r>
+            <a:endParaRPr lang="de-AT" dirty="0" smtClean="0"/>
+          </a:p>
+          <a:p>
+            <a:pPr marL="0" lvl="2" indent="0">
+              <a:buNone/>
+              <a:tabLst>
+                <a:tab pos="717550" algn="l"/>
+              </a:tabLst>
+            </a:pPr>
+            <a:endParaRPr lang="de-AT" sz="1000" dirty="0"/>
+          </a:p>
+          <a:p>
+            <a:pPr marL="266700" lvl="1" indent="-266700">
+              <a:tabLst>
+                <a:tab pos="717550" algn="l"/>
+              </a:tabLst>
+            </a:pPr>
+            <a:r>
+              <a:rPr lang="de-DE" sz="2800" dirty="0" err="1" smtClean="0"/>
+              <a:t>Votes</a:t>
+            </a:r>
+            <a:r>
+              <a:rPr lang="de-DE" sz="2800" dirty="0" smtClean="0"/>
+              <a:t> </a:t>
+            </a:r>
+            <a:r>
+              <a:rPr lang="de-DE" sz="2800" dirty="0" err="1" smtClean="0"/>
+              <a:t>are</a:t>
+            </a:r>
+            <a:r>
+              <a:rPr lang="de-DE" sz="2800" dirty="0" smtClean="0"/>
+              <a:t> </a:t>
+            </a:r>
+            <a:r>
+              <a:rPr lang="de-DE" sz="2800" dirty="0" err="1" smtClean="0"/>
+              <a:t>aggregated</a:t>
+            </a:r>
+            <a:r>
+              <a:rPr lang="de-DE" sz="2800" dirty="0" smtClean="0"/>
+              <a:t> on </a:t>
+            </a:r>
+            <a:r>
+              <a:rPr lang="de-DE" sz="2800" dirty="0" err="1" smtClean="0"/>
+              <a:t>insert</a:t>
+            </a:r>
+            <a:r>
+              <a:rPr lang="de-DE" sz="2800" dirty="0" smtClean="0"/>
+              <a:t> </a:t>
+            </a:r>
+            <a:r>
+              <a:rPr lang="de-DE" sz="2800" dirty="0" err="1" smtClean="0"/>
+              <a:t>by</a:t>
+            </a:r>
+            <a:r>
+              <a:rPr lang="de-DE" sz="2800" dirty="0" smtClean="0"/>
+              <a:t> </a:t>
+            </a:r>
+            <a:r>
+              <a:rPr lang="de-DE" sz="2800" dirty="0" err="1" smtClean="0"/>
+              <a:t>trigger</a:t>
+            </a:r>
+            <a:endParaRPr lang="de-DE" sz="2800" dirty="0" smtClean="0"/>
+          </a:p>
+          <a:p>
+            <a:pPr marL="723900" lvl="2" indent="-266700">
+              <a:tabLst>
+                <a:tab pos="717550" algn="l"/>
+              </a:tabLst>
+            </a:pPr>
+            <a:r>
+              <a:rPr lang="de-DE" dirty="0" smtClean="0"/>
+              <a:t>Wahlbezirk </a:t>
+            </a:r>
+            <a:r>
+              <a:rPr lang="de-DE" dirty="0" smtClean="0">
+                <a:sym typeface="Wingdings" panose="05000000000000000000" pitchFamily="2" charset="2"/>
+              </a:rPr>
+              <a:t> Wahlkreis  </a:t>
+            </a:r>
+            <a:r>
+              <a:rPr lang="de-DE" dirty="0" err="1" smtClean="0">
+                <a:sym typeface="Wingdings" panose="05000000000000000000" pitchFamily="2" charset="2"/>
+              </a:rPr>
+              <a:t>Federalstate</a:t>
+            </a:r>
+            <a:endParaRPr lang="de-DE" dirty="0" smtClean="0"/>
+          </a:p>
+          <a:p>
+            <a:pPr marL="266700" lvl="1" indent="-266700">
+              <a:tabLst>
+                <a:tab pos="717550" algn="l"/>
+              </a:tabLst>
+            </a:pPr>
+            <a:endParaRPr lang="de-DE" sz="900" dirty="0"/>
+          </a:p>
+          <a:p>
+            <a:pPr marL="457200" lvl="1" indent="0">
+              <a:buNone/>
+            </a:pPr>
+            <a:endParaRPr lang="de-DE" dirty="0"/>
+          </a:p>
+          <a:p>
+            <a:pPr lvl="1"/>
+            <a:endParaRPr lang="de-DE" dirty="0"/>
+          </a:p>
+        </p:txBody>
+      </p:sp>
+    </p:spTree>
+    <p:extLst>
+      <p:ext uri="{BB962C8B-B14F-4D97-AF65-F5344CB8AC3E}">
+        <p14:creationId xmlns:p14="http://schemas.microsoft.com/office/powerpoint/2010/main" val="3692834226"/>
+      </p:ext>
+    </p:extLst>
+  </p:cSld>
+  <p:clrMapOvr>
+    <a:masterClrMapping/>
+  </p:clrMapOvr>
+  <p:timing>
+    <p:tnLst>
+      <p:par>
+        <p:cTn id="1" dur="indefinite" restart="never" nodeType="tmRoot"/>
+      </p:par>
+    </p:tnLst>
+  </p:timing>
+</p:sld>
+</file>
+
+<file path=ppt/slides/slide7.xml><?xml version="1.0" encoding="utf-8"?>
+<p:sld xmlns:a="http://schemas.openxmlformats.org/drawingml/2006/main" xmlns:r="http://schemas.openxmlformats.org/officeDocument/2006/relationships" xmlns:p="http://schemas.openxmlformats.org/presentationml/2006/main">
+  <p:cSld>
+    <p:spTree>
+      <p:nvGrpSpPr>
+        <p:cNvPr id="1" name=""/>
+        <p:cNvGrpSpPr/>
+        <p:nvPr/>
+      </p:nvGrpSpPr>
+      <p:grpSpPr>
+        <a:xfrm>
+          <a:off x="0" y="0"/>
+          <a:ext cx="0" cy="0"/>
+          <a:chOff x="0" y="0"/>
+          <a:chExt cx="0" cy="0"/>
+        </a:xfrm>
+      </p:grpSpPr>
+      <p:sp>
+        <p:nvSpPr>
+          <p:cNvPr id="2" name="Titel 1"/>
+          <p:cNvSpPr>
+            <a:spLocks noGrp="1"/>
+          </p:cNvSpPr>
+          <p:nvPr>
+            <p:ph type="title"/>
+          </p:nvPr>
+        </p:nvSpPr>
+        <p:spPr/>
+        <p:txBody>
+          <a:bodyPr/>
+          <a:lstStyle/>
+          <a:p>
+            <a:r>
+              <a:rPr lang="de-DE" dirty="0" err="1" smtClean="0"/>
+              <a:t>Archiving</a:t>
+            </a:r>
+            <a:r>
+              <a:rPr lang="de-DE" dirty="0" smtClean="0"/>
+              <a:t> </a:t>
+            </a:r>
+            <a:r>
+              <a:rPr lang="de-DE" dirty="0" err="1" smtClean="0"/>
+              <a:t>Completed</a:t>
+            </a:r>
+            <a:r>
+              <a:rPr lang="de-DE" dirty="0" smtClean="0"/>
+              <a:t> </a:t>
+            </a:r>
+            <a:r>
+              <a:rPr lang="de-DE" dirty="0" err="1" smtClean="0"/>
+              <a:t>Elections</a:t>
+            </a:r>
+            <a:endParaRPr lang="de-DE" dirty="0"/>
+          </a:p>
+        </p:txBody>
+      </p:sp>
+      <p:sp>
+        <p:nvSpPr>
+          <p:cNvPr id="3" name="Inhaltsplatzhalter 2"/>
+          <p:cNvSpPr>
+            <a:spLocks noGrp="1"/>
+          </p:cNvSpPr>
+          <p:nvPr>
+            <p:ph idx="1"/>
+          </p:nvPr>
+        </p:nvSpPr>
+        <p:spPr>
+          <a:xfrm>
+            <a:off x="838200" y="1825625"/>
+            <a:ext cx="10298360" cy="3979639"/>
+          </a:xfrm>
+        </p:spPr>
+        <p:txBody>
+          <a:bodyPr/>
+          <a:lstStyle/>
+          <a:p>
+            <a:pPr marL="266700" lvl="1" indent="-266700">
+              <a:tabLst>
+                <a:tab pos="717550" algn="l"/>
+              </a:tabLst>
+            </a:pPr>
+            <a:endParaRPr lang="de-DE" sz="900" dirty="0"/>
+          </a:p>
+          <a:p>
+            <a:pPr marL="457200" lvl="1" indent="0">
+              <a:buNone/>
+            </a:pPr>
+            <a:endParaRPr lang="de-DE" dirty="0"/>
+          </a:p>
+          <a:p>
+            <a:pPr lvl="1"/>
+            <a:endParaRPr lang="de-DE" dirty="0"/>
+          </a:p>
+        </p:txBody>
+      </p:sp>
+      <p:sp>
+        <p:nvSpPr>
+          <p:cNvPr id="5" name="Inhaltsplatzhalter 2"/>
+          <p:cNvSpPr txBox="1">
+            <a:spLocks/>
+          </p:cNvSpPr>
+          <p:nvPr/>
+        </p:nvSpPr>
+        <p:spPr>
+          <a:xfrm>
+            <a:off x="990600" y="1978025"/>
+            <a:ext cx="10298360" cy="3979639"/>
+          </a:xfrm>
+          <a:prstGeom prst="rect">
+            <a:avLst/>
+          </a:prstGeom>
+        </p:spPr>
+        <p:txBody>
+          <a:bodyPr vert="horz" lIns="91440" tIns="45720" rIns="91440" bIns="45720" rtlCol="0">
+            <a:normAutofit/>
+          </a:bodyPr>
+          <a:lstStyle>
+            <a:lvl1pPr marL="228600" indent="-228600" algn="l" defTabSz="914400" rtl="0" eaLnBrk="1" latinLnBrk="0" hangingPunct="1">
+              <a:lnSpc>
+                <a:spcPct val="90000"/>
+              </a:lnSpc>
+              <a:spcBef>
+                <a:spcPts val="1000"/>
+              </a:spcBef>
+              <a:buFont typeface="Arial" panose="020B0604020202020204" pitchFamily="34" charset="0"/>
+              <a:buChar char="•"/>
+              <a:defRPr sz="2800" kern="1200">
+                <a:solidFill>
+                  <a:schemeClr val="tx1"/>
+                </a:solidFill>
+                <a:latin typeface="+mn-lt"/>
+                <a:ea typeface="+mn-ea"/>
+                <a:cs typeface="+mn-cs"/>
+              </a:defRPr>
+            </a:lvl1pPr>
+            <a:lvl2pPr marL="685800" indent="-228600" algn="l" defTabSz="914400" rtl="0" eaLnBrk="1" latinLnBrk="0" hangingPunct="1">
+              <a:lnSpc>
+                <a:spcPct val="90000"/>
+              </a:lnSpc>
+              <a:spcBef>
+                <a:spcPts val="500"/>
+              </a:spcBef>
+              <a:buFont typeface="Arial" panose="020B0604020202020204" pitchFamily="34" charset="0"/>
+              <a:buChar char="•"/>
+              <a:defRPr sz="2400" kern="1200">
+                <a:solidFill>
+                  <a:schemeClr val="tx1"/>
+                </a:solidFill>
+                <a:latin typeface="+mn-lt"/>
+                <a:ea typeface="+mn-ea"/>
+                <a:cs typeface="+mn-cs"/>
+              </a:defRPr>
+            </a:lvl2pPr>
+            <a:lvl3pPr marL="1143000" indent="-228600" algn="l" defTabSz="914400" rtl="0" eaLnBrk="1" latinLnBrk="0" hangingPunct="1">
+              <a:lnSpc>
+                <a:spcPct val="90000"/>
+              </a:lnSpc>
+              <a:spcBef>
+                <a:spcPts val="500"/>
+              </a:spcBef>
+              <a:buFont typeface="Arial" panose="020B0604020202020204" pitchFamily="34" charset="0"/>
+              <a:buChar char="•"/>
+              <a:defRPr sz="2000" kern="1200">
+                <a:solidFill>
+                  <a:schemeClr val="tx1"/>
+                </a:solidFill>
+                <a:latin typeface="+mn-lt"/>
+                <a:ea typeface="+mn-ea"/>
+                <a:cs typeface="+mn-cs"/>
+              </a:defRPr>
+            </a:lvl3pPr>
+            <a:lvl4pPr marL="1600200" indent="-228600" algn="l" defTabSz="914400" rtl="0" eaLnBrk="1" latinLnBrk="0" hangingPunct="1">
+              <a:lnSpc>
+                <a:spcPct val="90000"/>
+              </a:lnSpc>
+              <a:spcBef>
+                <a:spcPts val="500"/>
+              </a:spcBef>
+              <a:buFont typeface="Arial" panose="020B0604020202020204" pitchFamily="34" charset="0"/>
+              <a:buChar char="•"/>
+              <a:defRPr sz="1800" kern="1200">
+                <a:solidFill>
+                  <a:schemeClr val="tx1"/>
+                </a:solidFill>
+                <a:latin typeface="+mn-lt"/>
+                <a:ea typeface="+mn-ea"/>
+                <a:cs typeface="+mn-cs"/>
+              </a:defRPr>
+            </a:lvl4pPr>
+            <a:lvl5pPr marL="2057400" indent="-228600" algn="l" defTabSz="914400" rtl="0" eaLnBrk="1" latinLnBrk="0" hangingPunct="1">
+              <a:lnSpc>
+                <a:spcPct val="90000"/>
+              </a:lnSpc>
+              <a:spcBef>
+                <a:spcPts val="500"/>
+              </a:spcBef>
+              <a:buFont typeface="Arial" panose="020B0604020202020204" pitchFamily="34" charset="0"/>
+              <a:buChar char="•"/>
+              <a:defRPr sz="1800" kern="1200">
+                <a:solidFill>
+                  <a:schemeClr val="tx1"/>
+                </a:solidFill>
+                <a:latin typeface="+mn-lt"/>
+                <a:ea typeface="+mn-ea"/>
+                <a:cs typeface="+mn-cs"/>
+              </a:defRPr>
+            </a:lvl5pPr>
+            <a:lvl6pPr marL="2514600" indent="-228600" algn="l" defTabSz="914400" rtl="0" eaLnBrk="1" latinLnBrk="0" hangingPunct="1">
+              <a:lnSpc>
+                <a:spcPct val="90000"/>
+              </a:lnSpc>
+              <a:spcBef>
+                <a:spcPts val="500"/>
+              </a:spcBef>
+              <a:buFont typeface="Arial" panose="020B0604020202020204" pitchFamily="34" charset="0"/>
+              <a:buChar char="•"/>
+              <a:defRPr sz="1800" kern="1200">
+                <a:solidFill>
+                  <a:schemeClr val="tx1"/>
+                </a:solidFill>
+                <a:latin typeface="+mn-lt"/>
+                <a:ea typeface="+mn-ea"/>
+                <a:cs typeface="+mn-cs"/>
+              </a:defRPr>
+            </a:lvl6pPr>
+            <a:lvl7pPr marL="2971800" indent="-228600" algn="l" defTabSz="914400" rtl="0" eaLnBrk="1" latinLnBrk="0" hangingPunct="1">
+              <a:lnSpc>
+                <a:spcPct val="90000"/>
+              </a:lnSpc>
+              <a:spcBef>
+                <a:spcPts val="500"/>
+              </a:spcBef>
+              <a:buFont typeface="Arial" panose="020B0604020202020204" pitchFamily="34" charset="0"/>
+              <a:buChar char="•"/>
+              <a:defRPr sz="1800" kern="1200">
+                <a:solidFill>
+                  <a:schemeClr val="tx1"/>
+                </a:solidFill>
+                <a:latin typeface="+mn-lt"/>
+                <a:ea typeface="+mn-ea"/>
+                <a:cs typeface="+mn-cs"/>
+              </a:defRPr>
+            </a:lvl7pPr>
+            <a:lvl8pPr marL="3429000" indent="-228600" algn="l" defTabSz="914400" rtl="0" eaLnBrk="1" latinLnBrk="0" hangingPunct="1">
+              <a:lnSpc>
+                <a:spcPct val="90000"/>
+              </a:lnSpc>
+              <a:spcBef>
+                <a:spcPts val="500"/>
+              </a:spcBef>
+              <a:buFont typeface="Arial" panose="020B0604020202020204" pitchFamily="34" charset="0"/>
+              <a:buChar char="•"/>
+              <a:defRPr sz="1800" kern="1200">
+                <a:solidFill>
+                  <a:schemeClr val="tx1"/>
+                </a:solidFill>
+                <a:latin typeface="+mn-lt"/>
+                <a:ea typeface="+mn-ea"/>
+                <a:cs typeface="+mn-cs"/>
+              </a:defRPr>
+            </a:lvl8pPr>
+            <a:lvl9pPr marL="3886200" indent="-228600" algn="l" defTabSz="914400" rtl="0" eaLnBrk="1" latinLnBrk="0" hangingPunct="1">
+              <a:lnSpc>
+                <a:spcPct val="90000"/>
+              </a:lnSpc>
+              <a:spcBef>
+                <a:spcPts val="500"/>
+              </a:spcBef>
+              <a:buFont typeface="Arial" panose="020B0604020202020204" pitchFamily="34" charset="0"/>
+              <a:buChar char="•"/>
+              <a:defRPr sz="1800" kern="1200">
+                <a:solidFill>
+                  <a:schemeClr val="tx1"/>
+                </a:solidFill>
+                <a:latin typeface="+mn-lt"/>
+                <a:ea typeface="+mn-ea"/>
+                <a:cs typeface="+mn-cs"/>
+              </a:defRPr>
+            </a:lvl9pPr>
+          </a:lstStyle>
+          <a:p>
+            <a:pPr marL="266700" lvl="1" indent="-266700">
+              <a:tabLst>
+                <a:tab pos="717550" algn="l"/>
+              </a:tabLst>
+            </a:pPr>
+            <a:r>
+              <a:rPr lang="de-DE" sz="2800" dirty="0" err="1" smtClean="0"/>
+              <a:t>No</a:t>
+            </a:r>
+            <a:r>
+              <a:rPr lang="de-DE" sz="2800" dirty="0" smtClean="0"/>
+              <a:t> </a:t>
+            </a:r>
+            <a:r>
+              <a:rPr lang="de-DE" sz="2800" dirty="0" err="1" smtClean="0"/>
+              <a:t>calculation</a:t>
+            </a:r>
+            <a:r>
+              <a:rPr lang="de-DE" sz="2800" dirty="0" smtClean="0"/>
+              <a:t> </a:t>
+            </a:r>
+            <a:r>
+              <a:rPr lang="de-DE" sz="2800" dirty="0" err="1" smtClean="0"/>
+              <a:t>for</a:t>
+            </a:r>
+            <a:r>
+              <a:rPr lang="de-DE" sz="2800" dirty="0" smtClean="0"/>
+              <a:t> </a:t>
+            </a:r>
+            <a:r>
+              <a:rPr lang="de-DE" sz="2800" dirty="0" err="1" smtClean="0"/>
+              <a:t>completed</a:t>
+            </a:r>
+            <a:r>
+              <a:rPr lang="de-DE" sz="2800" dirty="0" smtClean="0"/>
+              <a:t> </a:t>
+            </a:r>
+            <a:r>
+              <a:rPr lang="de-DE" sz="2800" dirty="0" err="1" smtClean="0"/>
+              <a:t>elections</a:t>
+            </a:r>
+            <a:endParaRPr lang="de-DE" dirty="0" smtClean="0"/>
+          </a:p>
+          <a:p>
+            <a:pPr marL="266700" lvl="1" indent="-266700">
+              <a:tabLst>
+                <a:tab pos="717550" algn="l"/>
+              </a:tabLst>
+            </a:pPr>
+            <a:endParaRPr lang="de-DE" sz="900" dirty="0" smtClean="0"/>
+          </a:p>
+          <a:p>
+            <a:pPr marL="457200" lvl="1" indent="0">
+              <a:buFont typeface="Arial" panose="020B0604020202020204" pitchFamily="34" charset="0"/>
+              <a:buNone/>
+            </a:pPr>
+            <a:endParaRPr lang="de-DE" dirty="0" smtClean="0"/>
+          </a:p>
+          <a:p>
+            <a:pPr lvl="1"/>
+            <a:endParaRPr lang="de-DE" dirty="0"/>
+          </a:p>
+        </p:txBody>
+      </p:sp>
+      <p:graphicFrame>
+        <p:nvGraphicFramePr>
+          <p:cNvPr id="7" name="Tabelle 6"/>
+          <p:cNvGraphicFramePr>
+            <a:graphicFrameLocks noGrp="1"/>
+          </p:cNvGraphicFramePr>
+          <p:nvPr>
+            <p:extLst>
+              <p:ext uri="{D42A27DB-BD31-4B8C-83A1-F6EECF244321}">
+                <p14:modId xmlns:p14="http://schemas.microsoft.com/office/powerpoint/2010/main" val="801223996"/>
+              </p:ext>
+            </p:extLst>
+          </p:nvPr>
+        </p:nvGraphicFramePr>
+        <p:xfrm>
+          <a:off x="550784" y="3939356"/>
+          <a:ext cx="3168352" cy="1112520"/>
+        </p:xfrm>
+        <a:graphic>
+          <a:graphicData uri="http://schemas.openxmlformats.org/drawingml/2006/table">
+            <a:tbl>
+              <a:tblPr firstRow="1" bandRow="1">
+                <a:tableStyleId>{5C22544A-7EE6-4342-B048-85BDC9FD1C3A}</a:tableStyleId>
+              </a:tblPr>
+              <a:tblGrid>
+                <a:gridCol w="792088"/>
+                <a:gridCol w="792088"/>
+                <a:gridCol w="792088"/>
+                <a:gridCol w="792088"/>
+              </a:tblGrid>
+              <a:tr h="370840">
+                <a:tc gridSpan="4">
+                  <a:txBody>
+                    <a:bodyPr/>
+                    <a:lstStyle/>
+                    <a:p>
+                      <a:r>
+                        <a:rPr lang="de-DE" dirty="0" err="1" smtClean="0"/>
+                        <a:t>Results_Delegates_Current</a:t>
+                      </a:r>
+                      <a:endParaRPr lang="de-AT" dirty="0"/>
+                    </a:p>
+                  </a:txBody>
+                  <a:tcPr/>
+                </a:tc>
+                <a:tc hMerge="1">
+                  <a:txBody>
+                    <a:bodyPr/>
+                    <a:lstStyle/>
+                    <a:p>
+                      <a:endParaRPr lang="de-AT"/>
+                    </a:p>
+                  </a:txBody>
+                  <a:tcPr/>
+                </a:tc>
+                <a:tc hMerge="1">
+                  <a:txBody>
+                    <a:bodyPr/>
+                    <a:lstStyle/>
+                    <a:p>
+                      <a:endParaRPr lang="de-AT"/>
+                    </a:p>
+                  </a:txBody>
+                  <a:tcPr/>
+                </a:tc>
+                <a:tc hMerge="1">
+                  <a:txBody>
+                    <a:bodyPr/>
+                    <a:lstStyle/>
+                    <a:p>
+                      <a:endParaRPr lang="de-AT" dirty="0"/>
+                    </a:p>
+                  </a:txBody>
+                  <a:tcPr/>
+                </a:tc>
+              </a:tr>
+              <a:tr h="370840">
+                <a:tc>
+                  <a:txBody>
+                    <a:bodyPr/>
+                    <a:lstStyle/>
+                    <a:p>
+                      <a:endParaRPr lang="de-AT"/>
+                    </a:p>
+                  </a:txBody>
+                  <a:tcPr/>
+                </a:tc>
+                <a:tc>
+                  <a:txBody>
+                    <a:bodyPr/>
+                    <a:lstStyle/>
+                    <a:p>
+                      <a:endParaRPr lang="de-AT"/>
+                    </a:p>
+                  </a:txBody>
+                  <a:tcPr/>
+                </a:tc>
+                <a:tc>
+                  <a:txBody>
+                    <a:bodyPr/>
+                    <a:lstStyle/>
+                    <a:p>
+                      <a:endParaRPr lang="de-AT"/>
+                    </a:p>
+                  </a:txBody>
+                  <a:tcPr/>
+                </a:tc>
+                <a:tc>
+                  <a:txBody>
+                    <a:bodyPr/>
+                    <a:lstStyle/>
+                    <a:p>
+                      <a:endParaRPr lang="de-AT" dirty="0"/>
+                    </a:p>
+                  </a:txBody>
+                  <a:tcPr/>
+                </a:tc>
+              </a:tr>
+              <a:tr h="370840">
+                <a:tc>
+                  <a:txBody>
+                    <a:bodyPr/>
+                    <a:lstStyle/>
+                    <a:p>
+                      <a:endParaRPr lang="de-AT"/>
+                    </a:p>
+                  </a:txBody>
+                  <a:tcPr/>
+                </a:tc>
+                <a:tc>
+                  <a:txBody>
+                    <a:bodyPr/>
+                    <a:lstStyle/>
+                    <a:p>
+                      <a:endParaRPr lang="de-AT"/>
+                    </a:p>
+                  </a:txBody>
+                  <a:tcPr/>
+                </a:tc>
+                <a:tc>
+                  <a:txBody>
+                    <a:bodyPr/>
+                    <a:lstStyle/>
+                    <a:p>
+                      <a:endParaRPr lang="de-AT"/>
+                    </a:p>
+                  </a:txBody>
+                  <a:tcPr/>
+                </a:tc>
+                <a:tc>
+                  <a:txBody>
+                    <a:bodyPr/>
+                    <a:lstStyle/>
+                    <a:p>
+                      <a:endParaRPr lang="de-AT" dirty="0"/>
+                    </a:p>
+                  </a:txBody>
+                  <a:tcPr/>
+                </a:tc>
+              </a:tr>
+            </a:tbl>
+          </a:graphicData>
+        </a:graphic>
+      </p:graphicFrame>
+      <p:graphicFrame>
+        <p:nvGraphicFramePr>
+          <p:cNvPr id="8" name="Tabelle 7"/>
+          <p:cNvGraphicFramePr>
+            <a:graphicFrameLocks noGrp="1"/>
+          </p:cNvGraphicFramePr>
+          <p:nvPr>
+            <p:extLst>
+              <p:ext uri="{D42A27DB-BD31-4B8C-83A1-F6EECF244321}">
+                <p14:modId xmlns:p14="http://schemas.microsoft.com/office/powerpoint/2010/main" val="3910111103"/>
+              </p:ext>
+            </p:extLst>
+          </p:nvPr>
+        </p:nvGraphicFramePr>
+        <p:xfrm>
+          <a:off x="7464152" y="3933057"/>
+          <a:ext cx="3168352" cy="1112520"/>
+        </p:xfrm>
+        <a:graphic>
+          <a:graphicData uri="http://schemas.openxmlformats.org/drawingml/2006/table">
+            <a:tbl>
+              <a:tblPr firstRow="1" bandRow="1">
+                <a:tableStyleId>{073A0DAA-6AF3-43AB-8588-CEC1D06C72B9}</a:tableStyleId>
+              </a:tblPr>
+              <a:tblGrid>
+                <a:gridCol w="792088"/>
+                <a:gridCol w="792088"/>
+                <a:gridCol w="792088"/>
+                <a:gridCol w="792088"/>
+              </a:tblGrid>
+              <a:tr h="370840">
+                <a:tc gridSpan="4">
+                  <a:txBody>
+                    <a:bodyPr/>
+                    <a:lstStyle/>
+                    <a:p>
+                      <a:r>
+                        <a:rPr lang="de-DE" dirty="0" err="1" smtClean="0"/>
+                        <a:t>Results_Delegates_Old</a:t>
+                      </a:r>
+                      <a:endParaRPr lang="de-AT" dirty="0"/>
+                    </a:p>
+                  </a:txBody>
+                  <a:tcPr/>
+                </a:tc>
+                <a:tc hMerge="1">
+                  <a:txBody>
+                    <a:bodyPr/>
+                    <a:lstStyle/>
+                    <a:p>
+                      <a:endParaRPr lang="de-AT"/>
+                    </a:p>
+                  </a:txBody>
+                  <a:tcPr/>
+                </a:tc>
+                <a:tc hMerge="1">
+                  <a:txBody>
+                    <a:bodyPr/>
+                    <a:lstStyle/>
+                    <a:p>
+                      <a:endParaRPr lang="de-AT"/>
+                    </a:p>
+                  </a:txBody>
+                  <a:tcPr/>
+                </a:tc>
+                <a:tc hMerge="1">
+                  <a:txBody>
+                    <a:bodyPr/>
+                    <a:lstStyle/>
+                    <a:p>
+                      <a:endParaRPr lang="de-AT" dirty="0"/>
+                    </a:p>
+                  </a:txBody>
+                  <a:tcPr/>
+                </a:tc>
+              </a:tr>
+              <a:tr h="370840">
+                <a:tc>
+                  <a:txBody>
+                    <a:bodyPr/>
+                    <a:lstStyle/>
+                    <a:p>
+                      <a:endParaRPr lang="de-AT"/>
+                    </a:p>
+                  </a:txBody>
+                  <a:tcPr/>
+                </a:tc>
+                <a:tc>
+                  <a:txBody>
+                    <a:bodyPr/>
+                    <a:lstStyle/>
+                    <a:p>
+                      <a:endParaRPr lang="de-AT" dirty="0"/>
+                    </a:p>
+                  </a:txBody>
+                  <a:tcPr/>
+                </a:tc>
+                <a:tc>
+                  <a:txBody>
+                    <a:bodyPr/>
+                    <a:lstStyle/>
+                    <a:p>
+                      <a:endParaRPr lang="de-AT" dirty="0"/>
+                    </a:p>
+                  </a:txBody>
+                  <a:tcPr/>
+                </a:tc>
+                <a:tc>
+                  <a:txBody>
+                    <a:bodyPr/>
+                    <a:lstStyle/>
+                    <a:p>
+                      <a:endParaRPr lang="de-AT" dirty="0"/>
+                    </a:p>
+                  </a:txBody>
+                  <a:tcPr/>
+                </a:tc>
+              </a:tr>
+              <a:tr h="370840">
+                <a:tc>
+                  <a:txBody>
+                    <a:bodyPr/>
+                    <a:lstStyle/>
+                    <a:p>
+                      <a:endParaRPr lang="de-AT" dirty="0"/>
+                    </a:p>
+                  </a:txBody>
+                  <a:tcPr/>
+                </a:tc>
+                <a:tc>
+                  <a:txBody>
+                    <a:bodyPr/>
+                    <a:lstStyle/>
+                    <a:p>
+                      <a:endParaRPr lang="de-AT"/>
+                    </a:p>
+                  </a:txBody>
+                  <a:tcPr/>
+                </a:tc>
+                <a:tc>
+                  <a:txBody>
+                    <a:bodyPr/>
+                    <a:lstStyle/>
+                    <a:p>
+                      <a:endParaRPr lang="de-AT" dirty="0"/>
+                    </a:p>
+                  </a:txBody>
+                  <a:tcPr/>
+                </a:tc>
+                <a:tc>
+                  <a:txBody>
+                    <a:bodyPr/>
+                    <a:lstStyle/>
+                    <a:p>
+                      <a:endParaRPr lang="de-AT" dirty="0"/>
+                    </a:p>
+                  </a:txBody>
+                  <a:tcPr/>
+                </a:tc>
+              </a:tr>
+            </a:tbl>
+          </a:graphicData>
+        </a:graphic>
+      </p:graphicFrame>
+      <p:graphicFrame>
+        <p:nvGraphicFramePr>
+          <p:cNvPr id="9" name="Tabelle 8"/>
+          <p:cNvGraphicFramePr>
+            <a:graphicFrameLocks noGrp="1"/>
+          </p:cNvGraphicFramePr>
+          <p:nvPr>
+            <p:extLst>
+              <p:ext uri="{D42A27DB-BD31-4B8C-83A1-F6EECF244321}">
+                <p14:modId xmlns:p14="http://schemas.microsoft.com/office/powerpoint/2010/main" val="2504620144"/>
+              </p:ext>
+            </p:extLst>
+          </p:nvPr>
+        </p:nvGraphicFramePr>
+        <p:xfrm>
+          <a:off x="4007768" y="2564904"/>
+          <a:ext cx="3168352" cy="1112520"/>
+        </p:xfrm>
+        <a:graphic>
+          <a:graphicData uri="http://schemas.openxmlformats.org/drawingml/2006/table">
+            <a:tbl>
+              <a:tblPr firstRow="1" bandRow="1">
+                <a:tableStyleId>{5C22544A-7EE6-4342-B048-85BDC9FD1C3A}</a:tableStyleId>
+              </a:tblPr>
+              <a:tblGrid>
+                <a:gridCol w="792088"/>
+                <a:gridCol w="792088"/>
+                <a:gridCol w="792088"/>
+                <a:gridCol w="792088"/>
+              </a:tblGrid>
+              <a:tr h="370840">
+                <a:tc gridSpan="4">
+                  <a:txBody>
+                    <a:bodyPr/>
+                    <a:lstStyle/>
+                    <a:p>
+                      <a:r>
+                        <a:rPr lang="de-DE" dirty="0" err="1" smtClean="0"/>
+                        <a:t>Results_Delegates</a:t>
+                      </a:r>
+                      <a:endParaRPr lang="de-AT" dirty="0"/>
+                    </a:p>
+                  </a:txBody>
+                  <a:tcPr/>
+                </a:tc>
+                <a:tc hMerge="1">
+                  <a:txBody>
+                    <a:bodyPr/>
+                    <a:lstStyle/>
+                    <a:p>
+                      <a:endParaRPr lang="de-AT"/>
+                    </a:p>
+                  </a:txBody>
+                  <a:tcPr/>
+                </a:tc>
+                <a:tc hMerge="1">
+                  <a:txBody>
+                    <a:bodyPr/>
+                    <a:lstStyle/>
+                    <a:p>
+                      <a:endParaRPr lang="de-AT"/>
+                    </a:p>
+                  </a:txBody>
+                  <a:tcPr/>
+                </a:tc>
+                <a:tc hMerge="1">
+                  <a:txBody>
+                    <a:bodyPr/>
+                    <a:lstStyle/>
+                    <a:p>
+                      <a:endParaRPr lang="de-AT" dirty="0"/>
+                    </a:p>
+                  </a:txBody>
+                  <a:tcPr/>
+                </a:tc>
+              </a:tr>
+              <a:tr h="370840">
+                <a:tc>
+                  <a:txBody>
+                    <a:bodyPr/>
+                    <a:lstStyle/>
+                    <a:p>
+                      <a:endParaRPr lang="de-AT"/>
+                    </a:p>
+                  </a:txBody>
+                  <a:tcPr/>
+                </a:tc>
+                <a:tc>
+                  <a:txBody>
+                    <a:bodyPr/>
+                    <a:lstStyle/>
+                    <a:p>
+                      <a:endParaRPr lang="de-AT"/>
+                    </a:p>
+                  </a:txBody>
+                  <a:tcPr/>
+                </a:tc>
+                <a:tc>
+                  <a:txBody>
+                    <a:bodyPr/>
+                    <a:lstStyle/>
+                    <a:p>
+                      <a:endParaRPr lang="de-AT"/>
+                    </a:p>
+                  </a:txBody>
+                  <a:tcPr/>
+                </a:tc>
+                <a:tc>
+                  <a:txBody>
+                    <a:bodyPr/>
+                    <a:lstStyle/>
+                    <a:p>
+                      <a:endParaRPr lang="de-AT" dirty="0"/>
+                    </a:p>
+                  </a:txBody>
+                  <a:tcPr/>
+                </a:tc>
+              </a:tr>
+              <a:tr h="370840">
+                <a:tc>
+                  <a:txBody>
+                    <a:bodyPr/>
+                    <a:lstStyle/>
+                    <a:p>
+                      <a:endParaRPr lang="de-AT"/>
+                    </a:p>
+                  </a:txBody>
+                  <a:tcPr/>
+                </a:tc>
+                <a:tc>
+                  <a:txBody>
+                    <a:bodyPr/>
+                    <a:lstStyle/>
+                    <a:p>
+                      <a:endParaRPr lang="de-AT"/>
+                    </a:p>
+                  </a:txBody>
+                  <a:tcPr/>
+                </a:tc>
+                <a:tc>
+                  <a:txBody>
+                    <a:bodyPr/>
+                    <a:lstStyle/>
+                    <a:p>
+                      <a:endParaRPr lang="de-AT"/>
+                    </a:p>
+                  </a:txBody>
+                  <a:tcPr/>
+                </a:tc>
+                <a:tc>
+                  <a:txBody>
+                    <a:bodyPr/>
+                    <a:lstStyle/>
+                    <a:p>
+                      <a:endParaRPr lang="de-AT" dirty="0"/>
+                    </a:p>
+                  </a:txBody>
+                  <a:tcPr/>
+                </a:tc>
+              </a:tr>
+            </a:tbl>
+          </a:graphicData>
+        </a:graphic>
+      </p:graphicFrame>
+      <p:cxnSp>
+        <p:nvCxnSpPr>
+          <p:cNvPr id="11" name="Gewinkelte Verbindung 10"/>
+          <p:cNvCxnSpPr>
+            <a:stCxn id="7" idx="3"/>
+            <a:endCxn id="9" idx="2"/>
+          </p:cNvCxnSpPr>
+          <p:nvPr/>
+        </p:nvCxnSpPr>
+        <p:spPr>
+          <a:xfrm flipV="1">
+            <a:off x="3719136" y="3677424"/>
+            <a:ext cx="1872808" cy="818192"/>
+          </a:xfrm>
+          <a:prstGeom prst="bentConnector2">
+            <a:avLst/>
+          </a:prstGeom>
+          <a:ln w="57150">
+            <a:tailEnd type="arrow"/>
+          </a:ln>
+        </p:spPr>
+        <p:style>
+          <a:lnRef idx="2">
+            <a:schemeClr val="accent2"/>
+          </a:lnRef>
+          <a:fillRef idx="0">
+            <a:schemeClr val="accent2"/>
+          </a:fillRef>
+          <a:effectRef idx="1">
+            <a:schemeClr val="accent2"/>
+          </a:effectRef>
+          <a:fontRef idx="minor">
+            <a:schemeClr val="tx1"/>
+          </a:fontRef>
+        </p:style>
+      </p:cxnSp>
+      <p:cxnSp>
+        <p:nvCxnSpPr>
+          <p:cNvPr id="15" name="Gewinkelte Verbindung 14"/>
+          <p:cNvCxnSpPr>
+            <a:stCxn id="8" idx="1"/>
+            <a:endCxn id="9" idx="2"/>
+          </p:cNvCxnSpPr>
+          <p:nvPr/>
+        </p:nvCxnSpPr>
+        <p:spPr>
+          <a:xfrm rot="10800000">
+            <a:off x="5591944" y="3677425"/>
+            <a:ext cx="1872208" cy="811893"/>
+          </a:xfrm>
+          <a:prstGeom prst="bentConnector2">
+            <a:avLst/>
+          </a:prstGeom>
+          <a:ln w="57150">
+            <a:tailEnd type="arrow"/>
+          </a:ln>
+        </p:spPr>
+        <p:style>
+          <a:lnRef idx="2">
+            <a:schemeClr val="accent2"/>
+          </a:lnRef>
+          <a:fillRef idx="0">
+            <a:schemeClr val="accent2"/>
+          </a:fillRef>
+          <a:effectRef idx="1">
+            <a:schemeClr val="accent2"/>
+          </a:effectRef>
+          <a:fontRef idx="minor">
+            <a:schemeClr val="tx1"/>
+          </a:fontRef>
+        </p:style>
+      </p:cxnSp>
+      <p:sp>
+        <p:nvSpPr>
+          <p:cNvPr id="20" name="Inhaltsplatzhalter 2"/>
+          <p:cNvSpPr txBox="1">
+            <a:spLocks/>
+          </p:cNvSpPr>
+          <p:nvPr/>
+        </p:nvSpPr>
+        <p:spPr>
+          <a:xfrm>
+            <a:off x="4799856" y="4581128"/>
+            <a:ext cx="1898104" cy="504056"/>
+          </a:xfrm>
+          <a:prstGeom prst="rect">
+            <a:avLst/>
+          </a:prstGeom>
+        </p:spPr>
+        <p:txBody>
+          <a:bodyPr vert="horz" lIns="91440" tIns="45720" rIns="91440" bIns="45720" rtlCol="0">
+            <a:normAutofit/>
+          </a:bodyPr>
+          <a:lstStyle>
+            <a:lvl1pPr marL="228600" indent="-228600" algn="l" defTabSz="914400" rtl="0" eaLnBrk="1" latinLnBrk="0" hangingPunct="1">
+              <a:lnSpc>
+                <a:spcPct val="90000"/>
+              </a:lnSpc>
+              <a:spcBef>
+                <a:spcPts val="1000"/>
+              </a:spcBef>
+              <a:buFont typeface="Arial" panose="020B0604020202020204" pitchFamily="34" charset="0"/>
+              <a:buChar char="•"/>
+              <a:defRPr sz="2800" kern="1200">
+                <a:solidFill>
+                  <a:schemeClr val="tx1"/>
+                </a:solidFill>
+                <a:latin typeface="+mn-lt"/>
+                <a:ea typeface="+mn-ea"/>
+                <a:cs typeface="+mn-cs"/>
+              </a:defRPr>
+            </a:lvl1pPr>
+            <a:lvl2pPr marL="685800" indent="-228600" algn="l" defTabSz="914400" rtl="0" eaLnBrk="1" latinLnBrk="0" hangingPunct="1">
+              <a:lnSpc>
+                <a:spcPct val="90000"/>
+              </a:lnSpc>
+              <a:spcBef>
+                <a:spcPts val="500"/>
+              </a:spcBef>
+              <a:buFont typeface="Arial" panose="020B0604020202020204" pitchFamily="34" charset="0"/>
+              <a:buChar char="•"/>
+              <a:defRPr sz="2400" kern="1200">
+                <a:solidFill>
+                  <a:schemeClr val="tx1"/>
+                </a:solidFill>
+                <a:latin typeface="+mn-lt"/>
+                <a:ea typeface="+mn-ea"/>
+                <a:cs typeface="+mn-cs"/>
+              </a:defRPr>
+            </a:lvl2pPr>
+            <a:lvl3pPr marL="1143000" indent="-228600" algn="l" defTabSz="914400" rtl="0" eaLnBrk="1" latinLnBrk="0" hangingPunct="1">
+              <a:lnSpc>
+                <a:spcPct val="90000"/>
+              </a:lnSpc>
+              <a:spcBef>
+                <a:spcPts val="500"/>
+              </a:spcBef>
+              <a:buFont typeface="Arial" panose="020B0604020202020204" pitchFamily="34" charset="0"/>
+              <a:buChar char="•"/>
+              <a:defRPr sz="2000" kern="1200">
+                <a:solidFill>
+                  <a:schemeClr val="tx1"/>
+                </a:solidFill>
+                <a:latin typeface="+mn-lt"/>
+                <a:ea typeface="+mn-ea"/>
+                <a:cs typeface="+mn-cs"/>
+              </a:defRPr>
+            </a:lvl3pPr>
+            <a:lvl4pPr marL="1600200" indent="-228600" algn="l" defTabSz="914400" rtl="0" eaLnBrk="1" latinLnBrk="0" hangingPunct="1">
+              <a:lnSpc>
+                <a:spcPct val="90000"/>
+              </a:lnSpc>
+              <a:spcBef>
+                <a:spcPts val="500"/>
+              </a:spcBef>
+              <a:buFont typeface="Arial" panose="020B0604020202020204" pitchFamily="34" charset="0"/>
+              <a:buChar char="•"/>
+              <a:defRPr sz="1800" kern="1200">
+                <a:solidFill>
+                  <a:schemeClr val="tx1"/>
+                </a:solidFill>
+                <a:latin typeface="+mn-lt"/>
+                <a:ea typeface="+mn-ea"/>
+                <a:cs typeface="+mn-cs"/>
+              </a:defRPr>
+            </a:lvl4pPr>
+            <a:lvl5pPr marL="2057400" indent="-228600" algn="l" defTabSz="914400" rtl="0" eaLnBrk="1" latinLnBrk="0" hangingPunct="1">
+              <a:lnSpc>
+                <a:spcPct val="90000"/>
+              </a:lnSpc>
+              <a:spcBef>
+                <a:spcPts val="500"/>
+              </a:spcBef>
+              <a:buFont typeface="Arial" panose="020B0604020202020204" pitchFamily="34" charset="0"/>
+              <a:buChar char="•"/>
+              <a:defRPr sz="1800" kern="1200">
+                <a:solidFill>
+                  <a:schemeClr val="tx1"/>
+                </a:solidFill>
+                <a:latin typeface="+mn-lt"/>
+                <a:ea typeface="+mn-ea"/>
+                <a:cs typeface="+mn-cs"/>
+              </a:defRPr>
+            </a:lvl5pPr>
+            <a:lvl6pPr marL="2514600" indent="-228600" algn="l" defTabSz="914400" rtl="0" eaLnBrk="1" latinLnBrk="0" hangingPunct="1">
+              <a:lnSpc>
+                <a:spcPct val="90000"/>
+              </a:lnSpc>
+              <a:spcBef>
+                <a:spcPts val="500"/>
+              </a:spcBef>
+              <a:buFont typeface="Arial" panose="020B0604020202020204" pitchFamily="34" charset="0"/>
+              <a:buChar char="•"/>
+              <a:defRPr sz="1800" kern="1200">
+                <a:solidFill>
+                  <a:schemeClr val="tx1"/>
+                </a:solidFill>
+                <a:latin typeface="+mn-lt"/>
+                <a:ea typeface="+mn-ea"/>
+                <a:cs typeface="+mn-cs"/>
+              </a:defRPr>
+            </a:lvl6pPr>
+            <a:lvl7pPr marL="2971800" indent="-228600" algn="l" defTabSz="914400" rtl="0" eaLnBrk="1" latinLnBrk="0" hangingPunct="1">
+              <a:lnSpc>
+                <a:spcPct val="90000"/>
+              </a:lnSpc>
+              <a:spcBef>
+                <a:spcPts val="500"/>
+              </a:spcBef>
+              <a:buFont typeface="Arial" panose="020B0604020202020204" pitchFamily="34" charset="0"/>
+              <a:buChar char="•"/>
+              <a:defRPr sz="1800" kern="1200">
+                <a:solidFill>
+                  <a:schemeClr val="tx1"/>
+                </a:solidFill>
+                <a:latin typeface="+mn-lt"/>
+                <a:ea typeface="+mn-ea"/>
+                <a:cs typeface="+mn-cs"/>
+              </a:defRPr>
+            </a:lvl7pPr>
+            <a:lvl8pPr marL="3429000" indent="-228600" algn="l" defTabSz="914400" rtl="0" eaLnBrk="1" latinLnBrk="0" hangingPunct="1">
+              <a:lnSpc>
+                <a:spcPct val="90000"/>
+              </a:lnSpc>
+              <a:spcBef>
+                <a:spcPts val="500"/>
+              </a:spcBef>
+              <a:buFont typeface="Arial" panose="020B0604020202020204" pitchFamily="34" charset="0"/>
+              <a:buChar char="•"/>
+              <a:defRPr sz="1800" kern="1200">
+                <a:solidFill>
+                  <a:schemeClr val="tx1"/>
+                </a:solidFill>
+                <a:latin typeface="+mn-lt"/>
+                <a:ea typeface="+mn-ea"/>
+                <a:cs typeface="+mn-cs"/>
+              </a:defRPr>
+            </a:lvl8pPr>
+            <a:lvl9pPr marL="3886200" indent="-228600" algn="l" defTabSz="914400" rtl="0" eaLnBrk="1" latinLnBrk="0" hangingPunct="1">
+              <a:lnSpc>
+                <a:spcPct val="90000"/>
+              </a:lnSpc>
+              <a:spcBef>
+                <a:spcPts val="500"/>
+              </a:spcBef>
+              <a:buFont typeface="Arial" panose="020B0604020202020204" pitchFamily="34" charset="0"/>
+              <a:buChar char="•"/>
+              <a:defRPr sz="1800" kern="1200">
+                <a:solidFill>
+                  <a:schemeClr val="tx1"/>
+                </a:solidFill>
+                <a:latin typeface="+mn-lt"/>
+                <a:ea typeface="+mn-ea"/>
+                <a:cs typeface="+mn-cs"/>
+              </a:defRPr>
+            </a:lvl9pPr>
+          </a:lstStyle>
+          <a:p>
+            <a:pPr marL="0" lvl="1" indent="0">
+              <a:buNone/>
+              <a:tabLst>
+                <a:tab pos="717550" algn="l"/>
+              </a:tabLst>
+            </a:pPr>
+            <a:r>
+              <a:rPr lang="de-DE" dirty="0" err="1" smtClean="0"/>
+              <a:t>unioned</a:t>
+            </a:r>
+            <a:endParaRPr lang="de-DE" dirty="0" smtClean="0"/>
+          </a:p>
+          <a:p>
+            <a:pPr marL="266700" lvl="1" indent="-266700">
+              <a:tabLst>
+                <a:tab pos="717550" algn="l"/>
+              </a:tabLst>
+            </a:pPr>
+            <a:endParaRPr lang="de-DE" sz="900" dirty="0" smtClean="0"/>
+          </a:p>
+          <a:p>
+            <a:pPr marL="457200" lvl="1" indent="0">
+              <a:buFont typeface="Arial" panose="020B0604020202020204" pitchFamily="34" charset="0"/>
+              <a:buNone/>
+            </a:pPr>
+            <a:endParaRPr lang="de-DE" dirty="0" smtClean="0"/>
+          </a:p>
+          <a:p>
+            <a:pPr lvl="1"/>
+            <a:endParaRPr lang="de-DE" dirty="0"/>
+          </a:p>
+        </p:txBody>
+      </p:sp>
+      <p:cxnSp>
+        <p:nvCxnSpPr>
+          <p:cNvPr id="37" name="Gewinkelte Verbindung 36"/>
+          <p:cNvCxnSpPr>
+            <a:endCxn id="8" idx="2"/>
+          </p:cNvCxnSpPr>
+          <p:nvPr/>
+        </p:nvCxnSpPr>
+        <p:spPr>
+          <a:xfrm flipV="1">
+            <a:off x="2135560" y="5045577"/>
+            <a:ext cx="6912768" cy="367247"/>
+          </a:xfrm>
+          <a:prstGeom prst="bentConnector2">
+            <a:avLst/>
+          </a:prstGeom>
+          <a:ln w="57150">
+            <a:tailEnd type="arrow"/>
+          </a:ln>
+        </p:spPr>
+        <p:style>
+          <a:lnRef idx="1">
+            <a:schemeClr val="accent6"/>
+          </a:lnRef>
+          <a:fillRef idx="0">
+            <a:schemeClr val="accent6"/>
+          </a:fillRef>
+          <a:effectRef idx="0">
+            <a:schemeClr val="accent6"/>
+          </a:effectRef>
+          <a:fontRef idx="minor">
+            <a:schemeClr val="tx1"/>
+          </a:fontRef>
+        </p:style>
+      </p:cxnSp>
+      <p:cxnSp>
+        <p:nvCxnSpPr>
+          <p:cNvPr id="41" name="Gerade Verbindung 40"/>
+          <p:cNvCxnSpPr/>
+          <p:nvPr/>
+        </p:nvCxnSpPr>
+        <p:spPr>
+          <a:xfrm>
+            <a:off x="2135560" y="5045577"/>
+            <a:ext cx="0" cy="399647"/>
+          </a:xfrm>
+          <a:prstGeom prst="line">
+            <a:avLst/>
+          </a:prstGeom>
+          <a:ln w="57150"/>
+        </p:spPr>
+        <p:style>
+          <a:lnRef idx="1">
+            <a:schemeClr val="accent6"/>
+          </a:lnRef>
+          <a:fillRef idx="0">
+            <a:schemeClr val="accent6"/>
+          </a:fillRef>
+          <a:effectRef idx="0">
+            <a:schemeClr val="accent6"/>
+          </a:effectRef>
+          <a:fontRef idx="minor">
+            <a:schemeClr val="tx1"/>
+          </a:fontRef>
+        </p:style>
+      </p:cxnSp>
+      <p:sp>
+        <p:nvSpPr>
+          <p:cNvPr id="43" name="Inhaltsplatzhalter 2"/>
+          <p:cNvSpPr txBox="1">
+            <a:spLocks/>
+          </p:cNvSpPr>
+          <p:nvPr/>
+        </p:nvSpPr>
+        <p:spPr>
+          <a:xfrm>
+            <a:off x="3657424" y="5525204"/>
+            <a:ext cx="4248472" cy="504056"/>
+          </a:xfrm>
+          <a:prstGeom prst="rect">
+            <a:avLst/>
+          </a:prstGeom>
+        </p:spPr>
+        <p:txBody>
+          <a:bodyPr vert="horz" lIns="91440" tIns="45720" rIns="91440" bIns="45720" rtlCol="0">
+            <a:normAutofit/>
+          </a:bodyPr>
+          <a:lstStyle>
+            <a:lvl1pPr marL="228600" indent="-228600" algn="l" defTabSz="914400" rtl="0" eaLnBrk="1" latinLnBrk="0" hangingPunct="1">
+              <a:lnSpc>
+                <a:spcPct val="90000"/>
+              </a:lnSpc>
+              <a:spcBef>
+                <a:spcPts val="1000"/>
+              </a:spcBef>
+              <a:buFont typeface="Arial" panose="020B0604020202020204" pitchFamily="34" charset="0"/>
+              <a:buChar char="•"/>
+              <a:defRPr sz="2800" kern="1200">
+                <a:solidFill>
+                  <a:schemeClr val="tx1"/>
+                </a:solidFill>
+                <a:latin typeface="+mn-lt"/>
+                <a:ea typeface="+mn-ea"/>
+                <a:cs typeface="+mn-cs"/>
+              </a:defRPr>
+            </a:lvl1pPr>
+            <a:lvl2pPr marL="685800" indent="-228600" algn="l" defTabSz="914400" rtl="0" eaLnBrk="1" latinLnBrk="0" hangingPunct="1">
+              <a:lnSpc>
+                <a:spcPct val="90000"/>
+              </a:lnSpc>
+              <a:spcBef>
+                <a:spcPts val="500"/>
+              </a:spcBef>
+              <a:buFont typeface="Arial" panose="020B0604020202020204" pitchFamily="34" charset="0"/>
+              <a:buChar char="•"/>
+              <a:defRPr sz="2400" kern="1200">
+                <a:solidFill>
+                  <a:schemeClr val="tx1"/>
+                </a:solidFill>
+                <a:latin typeface="+mn-lt"/>
+                <a:ea typeface="+mn-ea"/>
+                <a:cs typeface="+mn-cs"/>
+              </a:defRPr>
+            </a:lvl2pPr>
+            <a:lvl3pPr marL="1143000" indent="-228600" algn="l" defTabSz="914400" rtl="0" eaLnBrk="1" latinLnBrk="0" hangingPunct="1">
+              <a:lnSpc>
+                <a:spcPct val="90000"/>
+              </a:lnSpc>
+              <a:spcBef>
+                <a:spcPts val="500"/>
+              </a:spcBef>
+              <a:buFont typeface="Arial" panose="020B0604020202020204" pitchFamily="34" charset="0"/>
+              <a:buChar char="•"/>
+              <a:defRPr sz="2000" kern="1200">
+                <a:solidFill>
+                  <a:schemeClr val="tx1"/>
+                </a:solidFill>
+                <a:latin typeface="+mn-lt"/>
+                <a:ea typeface="+mn-ea"/>
+                <a:cs typeface="+mn-cs"/>
+              </a:defRPr>
+            </a:lvl3pPr>
+            <a:lvl4pPr marL="1600200" indent="-228600" algn="l" defTabSz="914400" rtl="0" eaLnBrk="1" latinLnBrk="0" hangingPunct="1">
+              <a:lnSpc>
+                <a:spcPct val="90000"/>
+              </a:lnSpc>
+              <a:spcBef>
+                <a:spcPts val="500"/>
+              </a:spcBef>
+              <a:buFont typeface="Arial" panose="020B0604020202020204" pitchFamily="34" charset="0"/>
+              <a:buChar char="•"/>
+              <a:defRPr sz="1800" kern="1200">
+                <a:solidFill>
+                  <a:schemeClr val="tx1"/>
+                </a:solidFill>
+                <a:latin typeface="+mn-lt"/>
+                <a:ea typeface="+mn-ea"/>
+                <a:cs typeface="+mn-cs"/>
+              </a:defRPr>
+            </a:lvl4pPr>
+            <a:lvl5pPr marL="2057400" indent="-228600" algn="l" defTabSz="914400" rtl="0" eaLnBrk="1" latinLnBrk="0" hangingPunct="1">
+              <a:lnSpc>
+                <a:spcPct val="90000"/>
+              </a:lnSpc>
+              <a:spcBef>
+                <a:spcPts val="500"/>
+              </a:spcBef>
+              <a:buFont typeface="Arial" panose="020B0604020202020204" pitchFamily="34" charset="0"/>
+              <a:buChar char="•"/>
+              <a:defRPr sz="1800" kern="1200">
+                <a:solidFill>
+                  <a:schemeClr val="tx1"/>
+                </a:solidFill>
+                <a:latin typeface="+mn-lt"/>
+                <a:ea typeface="+mn-ea"/>
+                <a:cs typeface="+mn-cs"/>
+              </a:defRPr>
+            </a:lvl5pPr>
+            <a:lvl6pPr marL="2514600" indent="-228600" algn="l" defTabSz="914400" rtl="0" eaLnBrk="1" latinLnBrk="0" hangingPunct="1">
+              <a:lnSpc>
+                <a:spcPct val="90000"/>
+              </a:lnSpc>
+              <a:spcBef>
+                <a:spcPts val="500"/>
+              </a:spcBef>
+              <a:buFont typeface="Arial" panose="020B0604020202020204" pitchFamily="34" charset="0"/>
+              <a:buChar char="•"/>
+              <a:defRPr sz="1800" kern="1200">
+                <a:solidFill>
+                  <a:schemeClr val="tx1"/>
+                </a:solidFill>
+                <a:latin typeface="+mn-lt"/>
+                <a:ea typeface="+mn-ea"/>
+                <a:cs typeface="+mn-cs"/>
+              </a:defRPr>
+            </a:lvl6pPr>
+            <a:lvl7pPr marL="2971800" indent="-228600" algn="l" defTabSz="914400" rtl="0" eaLnBrk="1" latinLnBrk="0" hangingPunct="1">
+              <a:lnSpc>
+                <a:spcPct val="90000"/>
+              </a:lnSpc>
+              <a:spcBef>
+                <a:spcPts val="500"/>
+              </a:spcBef>
+              <a:buFont typeface="Arial" panose="020B0604020202020204" pitchFamily="34" charset="0"/>
+              <a:buChar char="•"/>
+              <a:defRPr sz="1800" kern="1200">
+                <a:solidFill>
+                  <a:schemeClr val="tx1"/>
+                </a:solidFill>
+                <a:latin typeface="+mn-lt"/>
+                <a:ea typeface="+mn-ea"/>
+                <a:cs typeface="+mn-cs"/>
+              </a:defRPr>
+            </a:lvl7pPr>
+            <a:lvl8pPr marL="3429000" indent="-228600" algn="l" defTabSz="914400" rtl="0" eaLnBrk="1" latinLnBrk="0" hangingPunct="1">
+              <a:lnSpc>
+                <a:spcPct val="90000"/>
+              </a:lnSpc>
+              <a:spcBef>
+                <a:spcPts val="500"/>
+              </a:spcBef>
+              <a:buFont typeface="Arial" panose="020B0604020202020204" pitchFamily="34" charset="0"/>
+              <a:buChar char="•"/>
+              <a:defRPr sz="1800" kern="1200">
+                <a:solidFill>
+                  <a:schemeClr val="tx1"/>
+                </a:solidFill>
+                <a:latin typeface="+mn-lt"/>
+                <a:ea typeface="+mn-ea"/>
+                <a:cs typeface="+mn-cs"/>
+              </a:defRPr>
+            </a:lvl8pPr>
+            <a:lvl9pPr marL="3886200" indent="-228600" algn="l" defTabSz="914400" rtl="0" eaLnBrk="1" latinLnBrk="0" hangingPunct="1">
+              <a:lnSpc>
+                <a:spcPct val="90000"/>
+              </a:lnSpc>
+              <a:spcBef>
+                <a:spcPts val="500"/>
+              </a:spcBef>
+              <a:buFont typeface="Arial" panose="020B0604020202020204" pitchFamily="34" charset="0"/>
+              <a:buChar char="•"/>
+              <a:defRPr sz="1800" kern="1200">
+                <a:solidFill>
+                  <a:schemeClr val="tx1"/>
+                </a:solidFill>
+                <a:latin typeface="+mn-lt"/>
+                <a:ea typeface="+mn-ea"/>
+                <a:cs typeface="+mn-cs"/>
+              </a:defRPr>
+            </a:lvl9pPr>
+          </a:lstStyle>
+          <a:p>
+            <a:pPr marL="0" lvl="1" indent="0">
+              <a:buNone/>
+              <a:tabLst>
+                <a:tab pos="717550" algn="l"/>
+              </a:tabLst>
+            </a:pPr>
+            <a:r>
+              <a:rPr lang="de-DE" dirty="0" err="1" smtClean="0"/>
+              <a:t>Copied</a:t>
+            </a:r>
+            <a:r>
+              <a:rPr lang="de-DE" dirty="0" smtClean="0"/>
+              <a:t> at end </a:t>
+            </a:r>
+            <a:r>
+              <a:rPr lang="de-DE" dirty="0" err="1" smtClean="0"/>
+              <a:t>of</a:t>
+            </a:r>
+            <a:r>
+              <a:rPr lang="de-DE" dirty="0" smtClean="0"/>
+              <a:t> </a:t>
+            </a:r>
+            <a:r>
+              <a:rPr lang="de-DE" dirty="0" err="1" smtClean="0"/>
+              <a:t>election</a:t>
+            </a:r>
+            <a:endParaRPr lang="de-DE" dirty="0" smtClean="0"/>
+          </a:p>
+          <a:p>
+            <a:pPr marL="266700" lvl="1" indent="-266700">
+              <a:tabLst>
+                <a:tab pos="717550" algn="l"/>
+              </a:tabLst>
+            </a:pPr>
+            <a:endParaRPr lang="de-DE" sz="900" dirty="0" smtClean="0"/>
+          </a:p>
+          <a:p>
+            <a:pPr marL="457200" lvl="1" indent="0">
+              <a:buFont typeface="Arial" panose="020B0604020202020204" pitchFamily="34" charset="0"/>
+              <a:buNone/>
+            </a:pPr>
+            <a:endParaRPr lang="de-DE" dirty="0" smtClean="0"/>
+          </a:p>
+          <a:p>
+            <a:pPr lvl="1"/>
+            <a:endParaRPr lang="de-DE" dirty="0"/>
+          </a:p>
+        </p:txBody>
+      </p:sp>
+    </p:spTree>
+    <p:extLst>
+      <p:ext uri="{BB962C8B-B14F-4D97-AF65-F5344CB8AC3E}">
+        <p14:creationId xmlns:p14="http://schemas.microsoft.com/office/powerpoint/2010/main" val="2924074188"/>
+      </p:ext>
+    </p:extLst>
+  </p:cSld>
+  <p:clrMapOvr>
+    <a:masterClrMapping/>
+  </p:clrMapOvr>
+  <p:timing>
+    <p:tnLst>
+      <p:par>
+        <p:cTn id="1" dur="indefinite" restart="never" nodeType="tmRoot"/>
+      </p:par>
+    </p:tnLst>
+  </p:timing>
+</p:sld>
+</file>
+
+<file path=ppt/slides/slide8.xml><?xml version="1.0" encoding="utf-8"?>
+<p:sld xmlns:a="http://schemas.openxmlformats.org/drawingml/2006/main" xmlns:r="http://schemas.openxmlformats.org/officeDocument/2006/relationships" xmlns:p="http://schemas.openxmlformats.org/presentationml/2006/main">
+  <p:cSld>
+    <p:spTree>
+      <p:nvGrpSpPr>
+        <p:cNvPr id="1" name=""/>
+        <p:cNvGrpSpPr/>
+        <p:nvPr/>
+      </p:nvGrpSpPr>
+      <p:grpSpPr>
+        <a:xfrm>
+          <a:off x="0" y="0"/>
+          <a:ext cx="0" cy="0"/>
+          <a:chOff x="0" y="0"/>
+          <a:chExt cx="0" cy="0"/>
+        </a:xfrm>
+      </p:grpSpPr>
+      <p:sp>
+        <p:nvSpPr>
+          <p:cNvPr id="2" name="Titel 1"/>
+          <p:cNvSpPr>
+            <a:spLocks noGrp="1"/>
+          </p:cNvSpPr>
+          <p:nvPr>
+            <p:ph type="title"/>
+          </p:nvPr>
+        </p:nvSpPr>
+        <p:spPr/>
+        <p:txBody>
+          <a:bodyPr/>
+          <a:lstStyle/>
+          <a:p>
+            <a:r>
+              <a:rPr lang="de-DE" dirty="0" smtClean="0"/>
+              <a:t>SQL-Code, Höchstzahlverfahren</a:t>
+            </a:r>
+            <a:endParaRPr lang="de-DE" dirty="0"/>
+          </a:p>
+        </p:txBody>
+      </p:sp>
+      <p:sp>
+        <p:nvSpPr>
+          <p:cNvPr id="3" name="Inhaltsplatzhalter 2"/>
+          <p:cNvSpPr>
+            <a:spLocks noGrp="1"/>
+          </p:cNvSpPr>
+          <p:nvPr>
+            <p:ph idx="1"/>
+          </p:nvPr>
+        </p:nvSpPr>
+        <p:spPr>
+          <a:xfrm>
+            <a:off x="838200" y="1825625"/>
+            <a:ext cx="10298360" cy="3979639"/>
+          </a:xfrm>
+        </p:spPr>
+        <p:txBody>
+          <a:bodyPr/>
+          <a:lstStyle/>
+          <a:p>
+            <a:pPr marL="266700" lvl="1" indent="-266700">
+              <a:tabLst>
+                <a:tab pos="717550" algn="l"/>
+              </a:tabLst>
+            </a:pPr>
+            <a:endParaRPr lang="de-DE" sz="900" dirty="0"/>
+          </a:p>
+          <a:p>
+            <a:pPr marL="457200" lvl="1" indent="0">
+              <a:buNone/>
+            </a:pPr>
+            <a:endParaRPr lang="de-DE" dirty="0"/>
+          </a:p>
+          <a:p>
+            <a:pPr lvl="1"/>
+            <a:endParaRPr lang="de-DE" dirty="0"/>
+          </a:p>
+        </p:txBody>
+      </p:sp>
+      <p:pic>
+        <p:nvPicPr>
+          <p:cNvPr id="5" name="Grafik 4" descr="Bildschirmausschnitt"/>
+          <p:cNvPicPr>
+            <a:picLocks noChangeAspect="1"/>
+          </p:cNvPicPr>
+          <p:nvPr/>
+        </p:nvPicPr>
+        <p:blipFill>
+          <a:blip r:embed="rId2">
+            <a:extLst>
+              <a:ext uri="{28A0092B-C50C-407E-A947-70E740481C1C}">
+                <a14:useLocalDpi xmlns:a14="http://schemas.microsoft.com/office/drawing/2010/main" val="0"/>
+              </a:ext>
+            </a:extLst>
+          </a:blip>
+          <a:stretch>
+            <a:fillRect/>
+          </a:stretch>
+        </p:blipFill>
+        <p:spPr>
+          <a:xfrm>
+            <a:off x="1559496" y="1449279"/>
+            <a:ext cx="9145016" cy="4393695"/>
+          </a:xfrm>
+          <a:prstGeom prst="rect">
+            <a:avLst/>
+          </a:prstGeom>
+        </p:spPr>
+      </p:pic>
+    </p:spTree>
+    <p:extLst>
+      <p:ext uri="{BB962C8B-B14F-4D97-AF65-F5344CB8AC3E}">
+        <p14:creationId xmlns:p14="http://schemas.microsoft.com/office/powerpoint/2010/main" val="1868598660"/>
+      </p:ext>
+    </p:extLst>
+  </p:cSld>
+  <p:clrMapOvr>
+    <a:masterClrMapping/>
+  </p:clrMapOvr>
+  <p:timing>
+    <p:tnLst>
+      <p:par>
+        <p:cTn id="1" dur="indefinite" restart="never" nodeType="tmRoot"/>
+      </p:par>
+    </p:tnLst>
+  </p:timing>
+</p:sld>
+</file>
+
+<file path=ppt/slides/slide9.xml><?xml version="1.0" encoding="utf-8"?>
 <p:sld xmlns:a="http://schemas.openxmlformats.org/drawingml/2006/main" xmlns:r="http://schemas.openxmlformats.org/officeDocument/2006/relationships" xmlns:p="http://schemas.openxmlformats.org/presentationml/2006/main">
   <p:cSld>
     <p:spTree>
@@ -3971,81 +6875,6 @@
             </p:seq>
           </p:childTnLst>
         </p:cTn>
-      </p:par>
-    </p:tnLst>
-  </p:timing>
-</p:sld>
-</file>
-
-<file path=ppt/slides/slide5.xml><?xml version="1.0" encoding="utf-8"?>
-<p:sld xmlns:a="http://schemas.openxmlformats.org/drawingml/2006/main" xmlns:r="http://schemas.openxmlformats.org/officeDocument/2006/relationships" xmlns:p="http://schemas.openxmlformats.org/presentationml/2006/main">
-  <p:cSld>
-    <p:spTree>
-      <p:nvGrpSpPr>
-        <p:cNvPr id="1" name=""/>
-        <p:cNvGrpSpPr/>
-        <p:nvPr/>
-      </p:nvGrpSpPr>
-      <p:grpSpPr>
-        <a:xfrm>
-          <a:off x="0" y="0"/>
-          <a:ext cx="0" cy="0"/>
-          <a:chOff x="0" y="0"/>
-          <a:chExt cx="0" cy="0"/>
-        </a:xfrm>
-      </p:grpSpPr>
-      <p:sp>
-        <p:nvSpPr>
-          <p:cNvPr id="2" name="Titel 1"/>
-          <p:cNvSpPr>
-            <a:spLocks noGrp="1"/>
-          </p:cNvSpPr>
-          <p:nvPr>
-            <p:ph type="title"/>
-          </p:nvPr>
-        </p:nvSpPr>
-        <p:spPr/>
-        <p:txBody>
-          <a:bodyPr/>
-          <a:lstStyle/>
-          <a:p>
-            <a:endParaRPr lang="de-DE" dirty="0"/>
-          </a:p>
-        </p:txBody>
-      </p:sp>
-      <p:sp>
-        <p:nvSpPr>
-          <p:cNvPr id="3" name="Inhaltsplatzhalter 2"/>
-          <p:cNvSpPr>
-            <a:spLocks noGrp="1"/>
-          </p:cNvSpPr>
-          <p:nvPr>
-            <p:ph idx="1"/>
-          </p:nvPr>
-        </p:nvSpPr>
-        <p:spPr/>
-        <p:txBody>
-          <a:bodyPr/>
-          <a:lstStyle/>
-          <a:p>
-            <a:endParaRPr lang="de-DE"/>
-          </a:p>
-        </p:txBody>
-      </p:sp>
-    </p:spTree>
-    <p:extLst>
-      <p:ext uri="{BB962C8B-B14F-4D97-AF65-F5344CB8AC3E}">
-        <p14:creationId xmlns:p14="http://schemas.microsoft.com/office/powerpoint/2010/main" val="790646626"/>
-      </p:ext>
-    </p:extLst>
-  </p:cSld>
-  <p:clrMapOvr>
-    <a:masterClrMapping/>
-  </p:clrMapOvr>
-  <p:timing>
-    <p:tnLst>
-      <p:par>
-        <p:cTn id="1" dur="indefinite" restart="never" nodeType="tmRoot"/>
       </p:par>
     </p:tnLst>
   </p:timing>
@@ -4247,7 +7076,7 @@
   <a:extraClrSchemeLst/>
   <a:extLst>
     <a:ext uri="{05A4C25C-085E-4340-85A3-A5531E510DB2}">
-      <thm15:themeFamily xmlns:thm15="http://schemas.microsoft.com/office/thememl/2012/main" name="Office Theme" id="{62F939B6-93AF-4DB8-9C6B-D6C7DFDC589F}" vid="{4A3C46E8-61CC-4603-A589-7422A47A8E4A}"/>
+      <thm15:themeFamily xmlns="" xmlns:thm15="http://schemas.microsoft.com/office/thememl/2012/main" name="Office Theme" id="{62F939B6-93AF-4DB8-9C6B-D6C7DFDC589F}" vid="{4A3C46E8-61CC-4603-A589-7422A47A8E4A}"/>
     </a:ext>
   </a:extLst>
 </a:theme>

</xml_diff>

<commit_message>
changed BIGINT to INT in Code Slide
</commit_message>
<xml_diff>
--- a/slides.pptx
+++ b/slides.pptx
@@ -176,7 +176,7 @@
       </p14:sectionLst>
     </p:ext>
     <p:ext uri="{EFAFB233-063F-42B5-8137-9DF3F51BA10A}">
-      <p15:sldGuideLst xmlns:p15="http://schemas.microsoft.com/office/powerpoint/2012/main">
+      <p15:sldGuideLst xmlns:p15="http://schemas.microsoft.com/office/powerpoint/2012/main" xmlns="">
         <p15:guide id="1" orient="horz" pos="2160">
           <p15:clr>
             <a:srgbClr val="A4A3A4"/>
@@ -196,7 +196,7 @@
 <file path=ppt/charts/chart1.xml><?xml version="1.0" encoding="utf-8"?>
 <c:chartSpace xmlns:c="http://schemas.openxmlformats.org/drawingml/2006/chart" xmlns:a="http://schemas.openxmlformats.org/drawingml/2006/main" xmlns:r="http://schemas.openxmlformats.org/officeDocument/2006/relationships">
   <c:date1904 val="0"/>
-  <c:lang val="de-DE"/>
+  <c:lang val="de-AT"/>
   <c:roundedCorners val="0"/>
   <mc:AlternateContent xmlns:mc="http://schemas.openxmlformats.org/markup-compatibility/2006">
     <mc:Choice xmlns:c14="http://schemas.microsoft.com/office/drawing/2007/8/2/chart" Requires="c14">
@@ -271,17 +271,7 @@
                 <a:latin typeface="Roboto" panose="02000000000000000000" pitchFamily="2" charset="0"/>
                 <a:ea typeface="Roboto" panose="02000000000000000000" pitchFamily="2" charset="0"/>
               </a:rPr>
-              <a:t> </a:t>
-            </a:r>
-            <a:r>
-              <a:rPr lang="de-DE" dirty="0" smtClean="0">
-                <a:solidFill>
-                  <a:schemeClr val="tx1"/>
-                </a:solidFill>
-                <a:latin typeface="Roboto" panose="02000000000000000000" pitchFamily="2" charset="0"/>
-                <a:ea typeface="Roboto" panose="02000000000000000000" pitchFamily="2" charset="0"/>
-              </a:rPr>
-              <a:t>time</a:t>
+              <a:t> time</a:t>
             </a:r>
             <a:endParaRPr lang="de-DE" dirty="0">
               <a:solidFill>
@@ -302,23 +292,6 @@
         </a:ln>
         <a:effectLst/>
       </c:spPr>
-      <c:txPr>
-        <a:bodyPr rot="0" spcFirstLastPara="1" vertOverflow="ellipsis" vert="horz" wrap="square" anchor="ctr" anchorCtr="1"/>
-        <a:lstStyle/>
-        <a:p>
-          <a:pPr>
-            <a:defRPr sz="1400" b="0" i="0" u="none" strike="noStrike" kern="1200" spc="0" baseline="0">
-              <a:solidFill>
-                <a:schemeClr val="tx1"/>
-              </a:solidFill>
-              <a:latin typeface="+mn-lt"/>
-              <a:ea typeface="+mn-ea"/>
-              <a:cs typeface="+mn-cs"/>
-            </a:defRPr>
-          </a:pPr>
-          <a:endParaRPr lang="de-DE"/>
-        </a:p>
-      </c:txPr>
     </c:title>
     <c:autoTitleDeleted val="0"/>
     <c:plotArea>
@@ -5258,12 +5231,13 @@
           <c:showPercent val="0"/>
           <c:showBubbleSize val="0"/>
         </c:dLbls>
+        <c:marker val="1"/>
         <c:smooth val="0"/>
-        <c:axId val="1060388480"/>
-        <c:axId val="1060393376"/>
+        <c:axId val="127383424"/>
+        <c:axId val="74698752"/>
       </c:lineChart>
       <c:catAx>
-        <c:axId val="1060388480"/>
+        <c:axId val="127383424"/>
         <c:scaling>
           <c:orientation val="minMax"/>
         </c:scaling>
@@ -5272,7 +5246,7 @@
         <c:majorTickMark val="none"/>
         <c:minorTickMark val="none"/>
         <c:tickLblPos val="nextTo"/>
-        <c:crossAx val="1060393376"/>
+        <c:crossAx val="74698752"/>
         <c:crosses val="autoZero"/>
         <c:auto val="1"/>
         <c:lblAlgn val="ctr"/>
@@ -5280,7 +5254,7 @@
         <c:noMultiLvlLbl val="0"/>
       </c:catAx>
       <c:valAx>
-        <c:axId val="1060393376"/>
+        <c:axId val="74698752"/>
         <c:scaling>
           <c:orientation val="minMax"/>
           <c:max val="30000"/>
@@ -5332,7 +5306,7 @@
             <a:endParaRPr lang="de-DE"/>
           </a:p>
         </c:txPr>
-        <c:crossAx val="1060388480"/>
+        <c:crossAx val="127383424"/>
         <c:crosses val="autoZero"/>
         <c:crossBetween val="between"/>
       </c:valAx>
@@ -5365,7 +5339,7 @@
       <a:endParaRPr lang="de-DE"/>
     </a:p>
   </c:txPr>
-  <c:externalData r:id="rId3">
+  <c:externalData r:id="rId1">
     <c:autoUpdate val="0"/>
   </c:externalData>
 </c:chartSpace>
@@ -5374,7 +5348,7 @@
 <file path=ppt/charts/chart2.xml><?xml version="1.0" encoding="utf-8"?>
 <c:chartSpace xmlns:c="http://schemas.openxmlformats.org/drawingml/2006/chart" xmlns:a="http://schemas.openxmlformats.org/drawingml/2006/main" xmlns:r="http://schemas.openxmlformats.org/officeDocument/2006/relationships">
   <c:date1904 val="0"/>
-  <c:lang val="de-DE"/>
+  <c:lang val="de-AT"/>
   <c:roundedCorners val="0"/>
   <mc:AlternateContent xmlns:mc="http://schemas.openxmlformats.org/markup-compatibility/2006">
     <mc:Choice xmlns:c14="http://schemas.microsoft.com/office/drawing/2007/8/2/chart" Requires="c14">
@@ -5500,23 +5474,6 @@
         </a:ln>
         <a:effectLst/>
       </c:spPr>
-      <c:txPr>
-        <a:bodyPr rot="0" spcFirstLastPara="1" vertOverflow="ellipsis" vert="horz" wrap="square" anchor="ctr" anchorCtr="1"/>
-        <a:lstStyle/>
-        <a:p>
-          <a:pPr>
-            <a:defRPr sz="1400" b="0" i="0" u="none" strike="noStrike" kern="1200" spc="0" baseline="0">
-              <a:solidFill>
-                <a:schemeClr val="tx1"/>
-              </a:solidFill>
-              <a:latin typeface="+mn-lt"/>
-              <a:ea typeface="+mn-ea"/>
-              <a:cs typeface="+mn-cs"/>
-            </a:defRPr>
-          </a:pPr>
-          <a:endParaRPr lang="de-DE"/>
-        </a:p>
-      </c:txPr>
     </c:title>
     <c:autoTitleDeleted val="0"/>
     <c:plotArea>
@@ -6958,12 +6915,13 @@
           <c:showPercent val="0"/>
           <c:showBubbleSize val="0"/>
         </c:dLbls>
+        <c:marker val="1"/>
         <c:smooth val="0"/>
-        <c:axId val="934213824"/>
-        <c:axId val="934221984"/>
+        <c:axId val="132092288"/>
+        <c:axId val="132093824"/>
       </c:lineChart>
       <c:catAx>
-        <c:axId val="934213824"/>
+        <c:axId val="132092288"/>
         <c:scaling>
           <c:orientation val="minMax"/>
         </c:scaling>
@@ -6972,7 +6930,7 @@
         <c:majorTickMark val="none"/>
         <c:minorTickMark val="none"/>
         <c:tickLblPos val="nextTo"/>
-        <c:crossAx val="934221984"/>
+        <c:crossAx val="132093824"/>
         <c:crosses val="autoZero"/>
         <c:auto val="1"/>
         <c:lblAlgn val="ctr"/>
@@ -6980,7 +6938,7 @@
         <c:noMultiLvlLbl val="0"/>
       </c:catAx>
       <c:valAx>
-        <c:axId val="934221984"/>
+        <c:axId val="132093824"/>
         <c:scaling>
           <c:orientation val="minMax"/>
           <c:max val="30000"/>
@@ -7032,7 +6990,7 @@
             <a:endParaRPr lang="de-DE"/>
           </a:p>
         </c:txPr>
-        <c:crossAx val="934213824"/>
+        <c:crossAx val="132092288"/>
         <c:crosses val="autoZero"/>
         <c:crossBetween val="between"/>
         <c:majorUnit val="10000"/>
@@ -7066,7 +7024,7 @@
       <a:endParaRPr lang="de-DE"/>
     </a:p>
   </c:txPr>
-  <c:externalData r:id="rId3">
+  <c:externalData r:id="rId1">
     <c:autoUpdate val="0"/>
   </c:externalData>
 </c:chartSpace>
@@ -8266,7 +8224,7 @@
           <a:p>
             <a:fld id="{ECC7C240-07D1-4B76-BD2E-747908CEEFD9}" type="datetimeFigureOut">
               <a:rPr lang="de-DE" smtClean="0"/>
-              <a:t>23.01.2016</a:t>
+              <a:t>24.01.2016</a:t>
             </a:fld>
             <a:endParaRPr lang="de-DE"/>
           </a:p>
@@ -10242,7 +10200,7 @@
           <a:p>
             <a:fld id="{2D4AA6EA-0D90-46F4-B247-6A5A21F7EDC4}" type="datetimeFigureOut">
               <a:rPr lang="de-DE" smtClean="0"/>
-              <a:t>23.01.2016</a:t>
+              <a:t>24.01.2016</a:t>
             </a:fld>
             <a:endParaRPr lang="de-DE"/>
           </a:p>
@@ -10412,7 +10370,7 @@
           <a:p>
             <a:fld id="{2D4AA6EA-0D90-46F4-B247-6A5A21F7EDC4}" type="datetimeFigureOut">
               <a:rPr lang="de-DE" smtClean="0"/>
-              <a:t>23.01.2016</a:t>
+              <a:t>24.01.2016</a:t>
             </a:fld>
             <a:endParaRPr lang="de-DE"/>
           </a:p>
@@ -10592,7 +10550,7 @@
           <a:p>
             <a:fld id="{2D4AA6EA-0D90-46F4-B247-6A5A21F7EDC4}" type="datetimeFigureOut">
               <a:rPr lang="de-DE" smtClean="0"/>
-              <a:t>23.01.2016</a:t>
+              <a:t>24.01.2016</a:t>
             </a:fld>
             <a:endParaRPr lang="de-DE"/>
           </a:p>
@@ -10768,7 +10726,7 @@
           <a:p>
             <a:fld id="{2D4AA6EA-0D90-46F4-B247-6A5A21F7EDC4}" type="datetimeFigureOut">
               <a:rPr lang="de-DE" smtClean="0"/>
-              <a:t>23.01.2016</a:t>
+              <a:t>24.01.2016</a:t>
             </a:fld>
             <a:endParaRPr lang="de-DE"/>
           </a:p>
@@ -11014,7 +10972,7 @@
           <a:p>
             <a:fld id="{2D4AA6EA-0D90-46F4-B247-6A5A21F7EDC4}" type="datetimeFigureOut">
               <a:rPr lang="de-DE" smtClean="0"/>
-              <a:t>23.01.2016</a:t>
+              <a:t>24.01.2016</a:t>
             </a:fld>
             <a:endParaRPr lang="de-DE"/>
           </a:p>
@@ -11246,7 +11204,7 @@
           <a:p>
             <a:fld id="{2D4AA6EA-0D90-46F4-B247-6A5A21F7EDC4}" type="datetimeFigureOut">
               <a:rPr lang="de-DE" smtClean="0"/>
-              <a:t>23.01.2016</a:t>
+              <a:t>24.01.2016</a:t>
             </a:fld>
             <a:endParaRPr lang="de-DE"/>
           </a:p>
@@ -11613,7 +11571,7 @@
           <a:p>
             <a:fld id="{2D4AA6EA-0D90-46F4-B247-6A5A21F7EDC4}" type="datetimeFigureOut">
               <a:rPr lang="de-DE" smtClean="0"/>
-              <a:t>23.01.2016</a:t>
+              <a:t>24.01.2016</a:t>
             </a:fld>
             <a:endParaRPr lang="de-DE"/>
           </a:p>
@@ -11731,7 +11689,7 @@
           <a:p>
             <a:fld id="{2D4AA6EA-0D90-46F4-B247-6A5A21F7EDC4}" type="datetimeFigureOut">
               <a:rPr lang="de-DE" smtClean="0"/>
-              <a:t>23.01.2016</a:t>
+              <a:t>24.01.2016</a:t>
             </a:fld>
             <a:endParaRPr lang="de-DE"/>
           </a:p>
@@ -11826,7 +11784,7 @@
           <a:p>
             <a:fld id="{2D4AA6EA-0D90-46F4-B247-6A5A21F7EDC4}" type="datetimeFigureOut">
               <a:rPr lang="de-DE" smtClean="0"/>
-              <a:t>23.01.2016</a:t>
+              <a:t>24.01.2016</a:t>
             </a:fld>
             <a:endParaRPr lang="de-DE"/>
           </a:p>
@@ -12103,7 +12061,7 @@
           <a:p>
             <a:fld id="{2D4AA6EA-0D90-46F4-B247-6A5A21F7EDC4}" type="datetimeFigureOut">
               <a:rPr lang="de-DE" smtClean="0"/>
-              <a:t>23.01.2016</a:t>
+              <a:t>24.01.2016</a:t>
             </a:fld>
             <a:endParaRPr lang="de-DE"/>
           </a:p>
@@ -12356,7 +12314,7 @@
           <a:p>
             <a:fld id="{2D4AA6EA-0D90-46F4-B247-6A5A21F7EDC4}" type="datetimeFigureOut">
               <a:rPr lang="de-DE" smtClean="0"/>
-              <a:t>23.01.2016</a:t>
+              <a:t>24.01.2016</a:t>
             </a:fld>
             <a:endParaRPr lang="de-DE"/>
           </a:p>
@@ -12569,7 +12527,7 @@
           <a:p>
             <a:fld id="{2D4AA6EA-0D90-46F4-B247-6A5A21F7EDC4}" type="datetimeFigureOut">
               <a:rPr lang="de-DE" smtClean="0"/>
-              <a:t>23.01.2016</a:t>
+              <a:t>24.01.2016</a:t>
             </a:fld>
             <a:endParaRPr lang="de-DE"/>
           </a:p>
@@ -16010,20 +15968,30 @@
                 <a:latin typeface="Source Code Pro" panose="020B0509030403020204" pitchFamily="49" charset="0"/>
                 <a:ea typeface="Source Code Pro" panose="020B0509030403020204" pitchFamily="49" charset="0"/>
               </a:rPr>
-              <a:t>    seats </a:t>
-            </a:r>
-            <a:r>
-              <a:rPr lang="en-US" sz="1050" b="1" dirty="0" smtClean="0">
-                <a:solidFill>
-                  <a:srgbClr val="3BC0F0"/>
+              <a:t>    </a:t>
+            </a:r>
+            <a:r>
+              <a:rPr lang="en-US" sz="1050" smtClean="0">
+                <a:solidFill>
+                  <a:schemeClr val="bg1"/>
                 </a:solidFill>
                 <a:latin typeface="Source Code Pro" panose="020B0509030403020204" pitchFamily="49" charset="0"/>
                 <a:ea typeface="Source Code Pro" panose="020B0509030403020204" pitchFamily="49" charset="0"/>
               </a:rPr>
-              <a:t>BIGINT</a:t>
-            </a:r>
-            <a:r>
-              <a:rPr lang="en-US" sz="1050" dirty="0" smtClean="0">
+              <a:t>seats </a:t>
+            </a:r>
+            <a:r>
+              <a:rPr lang="en-US" sz="1050" b="1" smtClean="0">
+                <a:solidFill>
+                  <a:srgbClr val="3BC0F0"/>
+                </a:solidFill>
+                <a:latin typeface="Source Code Pro" panose="020B0509030403020204" pitchFamily="49" charset="0"/>
+                <a:ea typeface="Source Code Pro" panose="020B0509030403020204" pitchFamily="49" charset="0"/>
+              </a:rPr>
+              <a:t>INT</a:t>
+            </a:r>
+            <a:r>
+              <a:rPr lang="en-US" sz="1050" smtClean="0">
                 <a:solidFill>
                   <a:srgbClr val="3BC0F0"/>
                 </a:solidFill>
@@ -16546,45 +16514,6 @@
               <a:rPr lang="de-DE" dirty="0" smtClean="0"/>
               <a:t>SQL-Code, Höchstzahlverfahren</a:t>
             </a:r>
-            <a:endParaRPr lang="de-DE" dirty="0"/>
-          </a:p>
-        </p:txBody>
-      </p:sp>
-      <p:sp>
-        <p:nvSpPr>
-          <p:cNvPr id="3" name="Inhaltsplatzhalter 2"/>
-          <p:cNvSpPr>
-            <a:spLocks noGrp="1"/>
-          </p:cNvSpPr>
-          <p:nvPr>
-            <p:ph idx="1"/>
-          </p:nvPr>
-        </p:nvSpPr>
-        <p:spPr>
-          <a:xfrm>
-            <a:off x="838200" y="1825625"/>
-            <a:ext cx="10298360" cy="3979639"/>
-          </a:xfrm>
-        </p:spPr>
-        <p:txBody>
-          <a:bodyPr/>
-          <a:lstStyle/>
-          <a:p>
-            <a:pPr marL="266700" lvl="1" indent="-266700">
-              <a:tabLst>
-                <a:tab pos="717550" algn="l"/>
-              </a:tabLst>
-            </a:pPr>
-            <a:endParaRPr lang="de-DE" sz="900" dirty="0"/>
-          </a:p>
-          <a:p>
-            <a:pPr marL="457200" lvl="1" indent="0">
-              <a:buNone/>
-            </a:pPr>
-            <a:endParaRPr lang="de-DE" dirty="0"/>
-          </a:p>
-          <a:p>
-            <a:pPr lvl="1"/>
             <a:endParaRPr lang="de-DE" dirty="0"/>
           </a:p>
         </p:txBody>
@@ -16972,14 +16901,14 @@
                 <a:gridCol w="720080">
                   <a:extLst>
                     <a:ext uri="{9D8B030D-6E8A-4147-A177-3AD203B41FA5}">
-                      <a16:colId xmlns="" xmlns:a16="http://schemas.microsoft.com/office/drawing/2014/main" val="20000"/>
+                      <a16:colId xmlns:a16="http://schemas.microsoft.com/office/drawing/2014/main" xmlns="" val="20000"/>
                     </a:ext>
                   </a:extLst>
                 </a:gridCol>
                 <a:gridCol w="1656184">
                   <a:extLst>
                     <a:ext uri="{9D8B030D-6E8A-4147-A177-3AD203B41FA5}">
-                      <a16:colId xmlns="" xmlns:a16="http://schemas.microsoft.com/office/drawing/2014/main" val="20001"/>
+                      <a16:colId xmlns:a16="http://schemas.microsoft.com/office/drawing/2014/main" xmlns="" val="20001"/>
                     </a:ext>
                   </a:extLst>
                 </a:gridCol>
@@ -17206,7 +17135,7 @@
                 </a:tc>
                 <a:extLst>
                   <a:ext uri="{0D108BD9-81ED-4DB2-BD59-A6C34878D82A}">
-                    <a16:rowId xmlns="" xmlns:a16="http://schemas.microsoft.com/office/drawing/2014/main" val="10006"/>
+                    <a16:rowId xmlns:a16="http://schemas.microsoft.com/office/drawing/2014/main" xmlns="" val="10006"/>
                   </a:ext>
                 </a:extLst>
               </a:tr>
@@ -17366,7 +17295,7 @@
                 </a:tc>
                 <a:extLst>
                   <a:ext uri="{0D108BD9-81ED-4DB2-BD59-A6C34878D82A}">
-                    <a16:rowId xmlns="" xmlns:a16="http://schemas.microsoft.com/office/drawing/2014/main" val="10000"/>
+                    <a16:rowId xmlns:a16="http://schemas.microsoft.com/office/drawing/2014/main" xmlns="" val="10000"/>
                   </a:ext>
                 </a:extLst>
               </a:tr>
@@ -17499,7 +17428,7 @@
                 </a:tc>
                 <a:extLst>
                   <a:ext uri="{0D108BD9-81ED-4DB2-BD59-A6C34878D82A}">
-                    <a16:rowId xmlns="" xmlns:a16="http://schemas.microsoft.com/office/drawing/2014/main" val="10001"/>
+                    <a16:rowId xmlns:a16="http://schemas.microsoft.com/office/drawing/2014/main" xmlns="" val="10001"/>
                   </a:ext>
                 </a:extLst>
               </a:tr>
@@ -17632,7 +17561,7 @@
                 </a:tc>
                 <a:extLst>
                   <a:ext uri="{0D108BD9-81ED-4DB2-BD59-A6C34878D82A}">
-                    <a16:rowId xmlns="" xmlns:a16="http://schemas.microsoft.com/office/drawing/2014/main" val="10002"/>
+                    <a16:rowId xmlns:a16="http://schemas.microsoft.com/office/drawing/2014/main" xmlns="" val="10002"/>
                   </a:ext>
                 </a:extLst>
               </a:tr>
@@ -17765,7 +17694,7 @@
                 </a:tc>
                 <a:extLst>
                   <a:ext uri="{0D108BD9-81ED-4DB2-BD59-A6C34878D82A}">
-                    <a16:rowId xmlns="" xmlns:a16="http://schemas.microsoft.com/office/drawing/2014/main" val="10003"/>
+                    <a16:rowId xmlns:a16="http://schemas.microsoft.com/office/drawing/2014/main" xmlns="" val="10003"/>
                   </a:ext>
                 </a:extLst>
               </a:tr>
@@ -17898,7 +17827,7 @@
                 </a:tc>
                 <a:extLst>
                   <a:ext uri="{0D108BD9-81ED-4DB2-BD59-A6C34878D82A}">
-                    <a16:rowId xmlns="" xmlns:a16="http://schemas.microsoft.com/office/drawing/2014/main" val="10004"/>
+                    <a16:rowId xmlns:a16="http://schemas.microsoft.com/office/drawing/2014/main" xmlns="" val="10004"/>
                   </a:ext>
                 </a:extLst>
               </a:tr>
@@ -18043,7 +17972,7 @@
                 </a:tc>
                 <a:extLst>
                   <a:ext uri="{0D108BD9-81ED-4DB2-BD59-A6C34878D82A}">
-                    <a16:rowId xmlns="" xmlns:a16="http://schemas.microsoft.com/office/drawing/2014/main" val="10005"/>
+                    <a16:rowId xmlns:a16="http://schemas.microsoft.com/office/drawing/2014/main" xmlns="" val="10005"/>
                   </a:ext>
                 </a:extLst>
               </a:tr>
@@ -20197,11 +20126,7 @@
             </a:r>
             <a:r>
               <a:rPr lang="de-DE" dirty="0" smtClean="0"/>
-              <a:t> </a:t>
-            </a:r>
-            <a:r>
-              <a:rPr lang="de-DE" dirty="0" smtClean="0"/>
-              <a:t>Model</a:t>
+              <a:t> Model</a:t>
             </a:r>
             <a:endParaRPr lang="de-DE" dirty="0"/>
           </a:p>
@@ -20571,11 +20496,7 @@
             </a:r>
             <a:r>
               <a:rPr lang="de-DE" dirty="0" smtClean="0"/>
-              <a:t> </a:t>
-            </a:r>
-            <a:r>
-              <a:rPr lang="de-DE" dirty="0" smtClean="0"/>
-              <a:t>Model</a:t>
+              <a:t> Model</a:t>
             </a:r>
             <a:endParaRPr lang="de-DE" dirty="0"/>
           </a:p>
@@ -20633,11 +20554,7 @@
             </a:r>
             <a:r>
               <a:rPr lang="de-DE" dirty="0" smtClean="0"/>
-              <a:t> </a:t>
-            </a:r>
-            <a:r>
-              <a:rPr lang="de-DE" dirty="0" smtClean="0"/>
-              <a:t>box </a:t>
+              <a:t> box </a:t>
             </a:r>
             <a:r>
               <a:rPr lang="de-DE" dirty="0" err="1" smtClean="0"/>
@@ -20805,11 +20722,7 @@
             </a:r>
             <a:r>
               <a:rPr lang="de-DE" dirty="0" smtClean="0"/>
-              <a:t> </a:t>
-            </a:r>
-            <a:r>
-              <a:rPr lang="de-DE" dirty="0" smtClean="0"/>
-              <a:t>Model</a:t>
+              <a:t> Model</a:t>
             </a:r>
             <a:endParaRPr lang="de-DE" dirty="0"/>
           </a:p>
@@ -21253,11 +21166,7 @@
             </a:r>
             <a:r>
               <a:rPr lang="de-DE" sz="2800" dirty="0" smtClean="0"/>
-              <a:t> pure SQL </a:t>
-            </a:r>
-            <a:r>
-              <a:rPr lang="de-DE" sz="2800" dirty="0" smtClean="0"/>
-              <a:t>(</a:t>
+              <a:t> pure SQL (</a:t>
             </a:r>
             <a:r>
               <a:rPr lang="de-DE" sz="2800" dirty="0" err="1" smtClean="0"/>
@@ -21699,7 +21608,7 @@
   <a:extraClrSchemeLst/>
   <a:extLst>
     <a:ext uri="{05A4C25C-085E-4340-85A3-A5531E510DB2}">
-      <thm15:themeFamily xmlns:thm15="http://schemas.microsoft.com/office/thememl/2012/main" name="Office Theme" id="{62F939B6-93AF-4DB8-9C6B-D6C7DFDC589F}" vid="{4A3C46E8-61CC-4603-A589-7422A47A8E4A}"/>
+      <thm15:themeFamily xmlns:thm15="http://schemas.microsoft.com/office/thememl/2012/main" xmlns="" name="Office Theme" id="{62F939B6-93AF-4DB8-9C6B-D6C7DFDC589F}" vid="{4A3C46E8-61CC-4603-A589-7422A47A8E4A}"/>
     </a:ext>
   </a:extLst>
 </a:theme>
@@ -21960,7 +21869,7 @@
   <a:extraClrSchemeLst/>
   <a:extLst>
     <a:ext uri="{05A4C25C-085E-4340-85A3-A5531E510DB2}">
-      <thm15:themeFamily xmlns:thm15="http://schemas.microsoft.com/office/thememl/2012/main" name="Office Theme" id="{62F939B6-93AF-4DB8-9C6B-D6C7DFDC589F}" vid="{4A3C46E8-61CC-4603-A589-7422A47A8E4A}"/>
+      <thm15:themeFamily xmlns:thm15="http://schemas.microsoft.com/office/thememl/2012/main" xmlns="" name="Office Theme" id="{62F939B6-93AF-4DB8-9C6B-D6C7DFDC589F}" vid="{4A3C46E8-61CC-4603-A589-7422A47A8E4A}"/>
     </a:ext>
   </a:extLst>
 </a:theme>

</xml_diff>